<commit_message>
Site updated: 2018-10-02 17:32:43
</commit_message>
<xml_diff>
--- a/posts/我的博客规划路线图/规划图.pptx
+++ b/posts/我的博客规划路线图/规划图.pptx
@@ -8,7 +8,8 @@
     <p:sldId id="256" r:id="rId2"/>
     <p:sldId id="257" r:id="rId3"/>
     <p:sldId id="258" r:id="rId4"/>
-    <p:sldId id="259" r:id="rId5"/>
+    <p:sldId id="260" r:id="rId5"/>
+    <p:sldId id="259" r:id="rId6"/>
   </p:sldIdLst>
   <p:sldSz cx="14400213" cy="8999538"/>
   <p:notesSz cx="6858000" cy="9144000"/>
@@ -9135,12 +9136,42 @@
           </a:fontRef>
         </p:style>
       </p:cxnSp>
-      <p:sp>
-        <p:nvSpPr>
-          <p:cNvPr id="70" name="矩形: 圆角 69">
-            <a:extLst>
-              <a:ext uri="{FF2B5EF4-FFF2-40B4-BE49-F238E27FC236}">
-                <a16:creationId xmlns:a16="http://schemas.microsoft.com/office/drawing/2014/main" id="{EB100F23-57D8-439A-9308-06AF3EF6887D}"/>
+    </p:spTree>
+    <p:extLst>
+      <p:ext uri="{BB962C8B-B14F-4D97-AF65-F5344CB8AC3E}">
+        <p14:creationId xmlns:p14="http://schemas.microsoft.com/office/powerpoint/2010/main" val="1613237922"/>
+      </p:ext>
+    </p:extLst>
+  </p:cSld>
+  <p:clrMapOvr>
+    <a:masterClrMapping/>
+  </p:clrMapOvr>
+</p:sld>
+</file>
+
+<file path=ppt/slides/slide5.xml><?xml version="1.0" encoding="utf-8"?>
+<p:sld xmlns:a="http://schemas.openxmlformats.org/drawingml/2006/main" xmlns:r="http://schemas.openxmlformats.org/officeDocument/2006/relationships" xmlns:p="http://schemas.openxmlformats.org/presentationml/2006/main">
+  <p:cSld>
+    <p:spTree>
+      <p:nvGrpSpPr>
+        <p:cNvPr id="1" name=""/>
+        <p:cNvGrpSpPr/>
+        <p:nvPr/>
+      </p:nvGrpSpPr>
+      <p:grpSpPr>
+        <a:xfrm>
+          <a:off x="0" y="0"/>
+          <a:ext cx="0" cy="0"/>
+          <a:chOff x="0" y="0"/>
+          <a:chExt cx="0" cy="0"/>
+        </a:xfrm>
+      </p:grpSpPr>
+      <p:sp>
+        <p:nvSpPr>
+          <p:cNvPr id="108" name="矩形: 圆角 107">
+            <a:extLst>
+              <a:ext uri="{FF2B5EF4-FFF2-40B4-BE49-F238E27FC236}">
+                <a16:creationId xmlns:a16="http://schemas.microsoft.com/office/drawing/2014/main" id="{C75DE53D-16E8-4A5E-8CC9-19CE85ABFE07}"/>
               </a:ext>
             </a:extLst>
           </p:cNvPr>
@@ -9149,8 +9180,8 @@
         </p:nvSpPr>
         <p:spPr>
           <a:xfrm>
-            <a:off x="408475" y="7928096"/>
-            <a:ext cx="13243886" cy="940631"/>
+            <a:off x="408475" y="2945637"/>
+            <a:ext cx="13317905" cy="940631"/>
           </a:xfrm>
           <a:prstGeom prst="roundRect">
             <a:avLst/>
@@ -9189,10 +9220,10 @@
       </p:sp>
       <p:sp>
         <p:nvSpPr>
-          <p:cNvPr id="91" name="矩形: 圆角 90">
-            <a:extLst>
-              <a:ext uri="{FF2B5EF4-FFF2-40B4-BE49-F238E27FC236}">
-                <a16:creationId xmlns:a16="http://schemas.microsoft.com/office/drawing/2014/main" id="{BA148A32-3CCB-489A-8EE5-64C20F63CF60}"/>
+          <p:cNvPr id="69" name="矩形: 圆角 68">
+            <a:extLst>
+              <a:ext uri="{FF2B5EF4-FFF2-40B4-BE49-F238E27FC236}">
+                <a16:creationId xmlns:a16="http://schemas.microsoft.com/office/drawing/2014/main" id="{9C7C5F24-F92A-4A86-B2AE-41613A8FCC46}"/>
               </a:ext>
             </a:extLst>
           </p:cNvPr>
@@ -9201,12 +9232,71 @@
         </p:nvSpPr>
         <p:spPr>
           <a:xfrm>
-            <a:off x="683037" y="8324817"/>
-            <a:ext cx="6145966" cy="393932"/>
+            <a:off x="408475" y="1383060"/>
+            <a:ext cx="13317906" cy="406440"/>
           </a:xfrm>
           <a:prstGeom prst="roundRect">
             <a:avLst/>
           </a:prstGeom>
+          <a:solidFill>
+            <a:schemeClr val="bg2">
+              <a:lumMod val="75000"/>
+            </a:schemeClr>
+          </a:solidFill>
+        </p:spPr>
+        <p:style>
+          <a:lnRef idx="3">
+            <a:schemeClr val="lt1"/>
+          </a:lnRef>
+          <a:fillRef idx="1">
+            <a:schemeClr val="accent4"/>
+          </a:fillRef>
+          <a:effectRef idx="1">
+            <a:schemeClr val="accent4"/>
+          </a:effectRef>
+          <a:fontRef idx="minor">
+            <a:schemeClr val="lt1"/>
+          </a:fontRef>
+        </p:style>
+        <p:txBody>
+          <a:bodyPr rtlCol="0" anchor="ctr"/>
+          <a:lstStyle/>
+          <a:p>
+            <a:pPr algn="ctr"/>
+            <a:r>
+              <a:rPr lang="zh-CN" altLang="en-US" dirty="0"/>
+              <a:t>浏览器</a:t>
+            </a:r>
+            <a:endParaRPr lang="en-US" altLang="zh-CN" dirty="0"/>
+          </a:p>
+        </p:txBody>
+      </p:sp>
+      <p:sp>
+        <p:nvSpPr>
+          <p:cNvPr id="64" name="矩形: 圆角 63">
+            <a:extLst>
+              <a:ext uri="{FF2B5EF4-FFF2-40B4-BE49-F238E27FC236}">
+                <a16:creationId xmlns:a16="http://schemas.microsoft.com/office/drawing/2014/main" id="{847F6D18-B090-40DD-81E6-9BDB7222EA3C}"/>
+              </a:ext>
+            </a:extLst>
+          </p:cNvPr>
+          <p:cNvSpPr/>
+          <p:nvPr/>
+        </p:nvSpPr>
+        <p:spPr>
+          <a:xfrm>
+            <a:off x="408475" y="4344378"/>
+            <a:ext cx="6494548" cy="940631"/>
+          </a:xfrm>
+          <a:prstGeom prst="roundRect">
+            <a:avLst/>
+          </a:prstGeom>
+          <a:solidFill>
+            <a:schemeClr val="accent2">
+              <a:lumMod val="20000"/>
+              <a:lumOff val="80000"/>
+            </a:schemeClr>
+          </a:solidFill>
         </p:spPr>
         <p:style>
           <a:lnRef idx="2">
@@ -9229,35 +9319,16 @@
           <a:lstStyle/>
           <a:p>
             <a:pPr algn="ctr"/>
-            <a:r>
-              <a:rPr lang="en-US" altLang="zh-CN" dirty="0"/>
-              <a:t>KeepAlived + </a:t>
-            </a:r>
-            <a:r>
-              <a:rPr lang="en-US" altLang="zh-CN" dirty="0" err="1"/>
-              <a:t>MySql</a:t>
-            </a:r>
-            <a:r>
-              <a:rPr lang="zh-CN" altLang="en-US" dirty="0"/>
-              <a:t>（</a:t>
-            </a:r>
-            <a:r>
-              <a:rPr lang="en-US" altLang="zh-CN" dirty="0"/>
-              <a:t>192.168.1.132</a:t>
-            </a:r>
-            <a:r>
-              <a:rPr lang="zh-CN" altLang="en-US" dirty="0"/>
-              <a:t>）</a:t>
-            </a:r>
-          </a:p>
-        </p:txBody>
-      </p:sp>
-      <p:sp>
-        <p:nvSpPr>
-          <p:cNvPr id="92" name="矩形: 圆角 91">
-            <a:extLst>
-              <a:ext uri="{FF2B5EF4-FFF2-40B4-BE49-F238E27FC236}">
-                <a16:creationId xmlns:a16="http://schemas.microsoft.com/office/drawing/2014/main" id="{D2EF126C-849F-4709-83DB-8E2AB0CCF587}"/>
+            <a:endParaRPr lang="zh-CN" altLang="en-US"/>
+          </a:p>
+        </p:txBody>
+      </p:sp>
+      <p:sp>
+        <p:nvSpPr>
+          <p:cNvPr id="71" name="矩形: 圆角 70">
+            <a:extLst>
+              <a:ext uri="{FF2B5EF4-FFF2-40B4-BE49-F238E27FC236}">
+                <a16:creationId xmlns:a16="http://schemas.microsoft.com/office/drawing/2014/main" id="{6B29A048-5D39-4535-8F22-A58DBD32DDEB}"/>
               </a:ext>
             </a:extLst>
           </p:cNvPr>
@@ -9266,8 +9337,8 @@
         </p:nvSpPr>
         <p:spPr>
           <a:xfrm>
-            <a:off x="7231833" y="8360673"/>
-            <a:ext cx="6098979" cy="393932"/>
+            <a:off x="620621" y="4741064"/>
+            <a:ext cx="2754240" cy="393932"/>
           </a:xfrm>
           <a:prstGeom prst="roundRect">
             <a:avLst/>
@@ -9296,33 +9367,68 @@
             <a:pPr algn="ctr"/>
             <a:r>
               <a:rPr lang="en-US" altLang="zh-CN" dirty="0"/>
-              <a:t>HAProxy + </a:t>
-            </a:r>
-            <a:r>
-              <a:rPr lang="en-US" altLang="zh-CN" dirty="0" err="1"/>
-              <a:t>MySql</a:t>
-            </a:r>
-            <a:r>
-              <a:rPr lang="zh-CN" altLang="en-US" dirty="0"/>
-              <a:t> （</a:t>
-            </a:r>
+              <a:t>HAProxy+KeepAlived</a:t>
+            </a:r>
+            <a:endParaRPr lang="zh-CN" altLang="en-US" dirty="0"/>
+          </a:p>
+        </p:txBody>
+      </p:sp>
+      <p:sp>
+        <p:nvSpPr>
+          <p:cNvPr id="72" name="矩形: 圆角 71">
+            <a:extLst>
+              <a:ext uri="{FF2B5EF4-FFF2-40B4-BE49-F238E27FC236}">
+                <a16:creationId xmlns:a16="http://schemas.microsoft.com/office/drawing/2014/main" id="{E03A1689-AB2C-4034-8AA6-64B0B45E598F}"/>
+              </a:ext>
+            </a:extLst>
+          </p:cNvPr>
+          <p:cNvSpPr/>
+          <p:nvPr/>
+        </p:nvSpPr>
+        <p:spPr>
+          <a:xfrm>
+            <a:off x="4002488" y="4741063"/>
+            <a:ext cx="2754240" cy="393932"/>
+          </a:xfrm>
+          <a:prstGeom prst="roundRect">
+            <a:avLst/>
+          </a:prstGeom>
+        </p:spPr>
+        <p:style>
+          <a:lnRef idx="2">
+            <a:schemeClr val="accent1">
+              <a:shade val="50000"/>
+            </a:schemeClr>
+          </a:lnRef>
+          <a:fillRef idx="1">
+            <a:schemeClr val="accent1"/>
+          </a:fillRef>
+          <a:effectRef idx="0">
+            <a:schemeClr val="accent1"/>
+          </a:effectRef>
+          <a:fontRef idx="minor">
+            <a:schemeClr val="lt1"/>
+          </a:fontRef>
+        </p:style>
+        <p:txBody>
+          <a:bodyPr rtlCol="0" anchor="ctr"/>
+          <a:lstStyle/>
+          <a:p>
+            <a:pPr algn="ctr"/>
             <a:r>
               <a:rPr lang="en-US" altLang="zh-CN" dirty="0"/>
-              <a:t>192.168.1.133</a:t>
-            </a:r>
-            <a:r>
-              <a:rPr lang="zh-CN" altLang="en-US" dirty="0"/>
-              <a:t>）</a:t>
-            </a:r>
-          </a:p>
-        </p:txBody>
-      </p:sp>
-      <p:sp>
-        <p:nvSpPr>
-          <p:cNvPr id="95" name="文本框 94">
-            <a:extLst>
-              <a:ext uri="{FF2B5EF4-FFF2-40B4-BE49-F238E27FC236}">
-                <a16:creationId xmlns:a16="http://schemas.microsoft.com/office/drawing/2014/main" id="{DB3B4904-5D5E-4BEE-8041-DA6F1A326A25}"/>
+              <a:t>HAProxy+KeepAlived</a:t>
+            </a:r>
+            <a:endParaRPr lang="zh-CN" altLang="en-US" dirty="0"/>
+          </a:p>
+        </p:txBody>
+      </p:sp>
+      <p:sp>
+        <p:nvSpPr>
+          <p:cNvPr id="73" name="文本框 72">
+            <a:extLst>
+              <a:ext uri="{FF2B5EF4-FFF2-40B4-BE49-F238E27FC236}">
+                <a16:creationId xmlns:a16="http://schemas.microsoft.com/office/drawing/2014/main" id="{8A0CDAB6-1614-408C-8D26-F7F67764127E}"/>
               </a:ext>
             </a:extLst>
           </p:cNvPr>
@@ -9331,7 +9437,7 @@
         </p:nvSpPr>
         <p:spPr>
           <a:xfrm>
-            <a:off x="7190969" y="7535892"/>
+            <a:off x="3872794" y="3926372"/>
             <a:ext cx="1868837" cy="307777"/>
           </a:xfrm>
           <a:prstGeom prst="rect">
@@ -9359,7 +9465,7 @@
                   <a:srgbClr val="FF0000"/>
                 </a:solidFill>
               </a:rPr>
-              <a:t>: 192.168.1.134</a:t>
+              <a:t>: 192.168.1.104</a:t>
             </a:r>
             <a:endParaRPr lang="zh-CN" altLang="en-US" sz="1400" dirty="0">
               <a:solidFill>
@@ -9369,6 +9475,2393 @@
           </a:p>
         </p:txBody>
       </p:sp>
+      <p:sp>
+        <p:nvSpPr>
+          <p:cNvPr id="75" name="文本框 74">
+            <a:extLst>
+              <a:ext uri="{FF2B5EF4-FFF2-40B4-BE49-F238E27FC236}">
+                <a16:creationId xmlns:a16="http://schemas.microsoft.com/office/drawing/2014/main" id="{0862E938-C5F3-45F4-AF7E-E4AD43F0C8A7}"/>
+              </a:ext>
+            </a:extLst>
+          </p:cNvPr>
+          <p:cNvSpPr txBox="1"/>
+          <p:nvPr/>
+        </p:nvSpPr>
+        <p:spPr>
+          <a:xfrm>
+            <a:off x="5228938" y="4359534"/>
+            <a:ext cx="1440258" cy="307777"/>
+          </a:xfrm>
+          <a:prstGeom prst="rect">
+            <a:avLst/>
+          </a:prstGeom>
+          <a:noFill/>
+        </p:spPr>
+        <p:txBody>
+          <a:bodyPr wrap="square" rtlCol="0">
+            <a:spAutoFit/>
+          </a:bodyPr>
+          <a:lstStyle/>
+          <a:p>
+            <a:r>
+              <a:rPr lang="en-US" altLang="zh-CN" sz="1400" dirty="0"/>
+              <a:t>192.168.1.103</a:t>
+            </a:r>
+            <a:endParaRPr lang="zh-CN" altLang="en-US" sz="1400" dirty="0"/>
+          </a:p>
+        </p:txBody>
+      </p:sp>
+      <p:cxnSp>
+        <p:nvCxnSpPr>
+          <p:cNvPr id="76" name="直接箭头连接符 75">
+            <a:extLst>
+              <a:ext uri="{FF2B5EF4-FFF2-40B4-BE49-F238E27FC236}">
+                <a16:creationId xmlns:a16="http://schemas.microsoft.com/office/drawing/2014/main" id="{5FE9A05C-1F2F-4AA9-84FC-2827E7CC71EE}"/>
+              </a:ext>
+            </a:extLst>
+          </p:cNvPr>
+          <p:cNvCxnSpPr>
+            <a:cxnSpLocks/>
+            <a:stCxn id="64" idx="0"/>
+            <a:endCxn id="71" idx="0"/>
+          </p:cNvCxnSpPr>
+          <p:nvPr/>
+        </p:nvCxnSpPr>
+        <p:spPr>
+          <a:xfrm flipH="1">
+            <a:off x="1997742" y="4344376"/>
+            <a:ext cx="1658009" cy="396688"/>
+          </a:xfrm>
+          <a:prstGeom prst="straightConnector1">
+            <a:avLst/>
+          </a:prstGeom>
+          <a:ln>
+            <a:tailEnd type="triangle"/>
+          </a:ln>
+        </p:spPr>
+        <p:style>
+          <a:lnRef idx="1">
+            <a:schemeClr val="accent1"/>
+          </a:lnRef>
+          <a:fillRef idx="0">
+            <a:schemeClr val="accent1"/>
+          </a:fillRef>
+          <a:effectRef idx="0">
+            <a:schemeClr val="accent1"/>
+          </a:effectRef>
+          <a:fontRef idx="minor">
+            <a:schemeClr val="tx1"/>
+          </a:fontRef>
+        </p:style>
+      </p:cxnSp>
+      <p:cxnSp>
+        <p:nvCxnSpPr>
+          <p:cNvPr id="77" name="直接箭头连接符 76">
+            <a:extLst>
+              <a:ext uri="{FF2B5EF4-FFF2-40B4-BE49-F238E27FC236}">
+                <a16:creationId xmlns:a16="http://schemas.microsoft.com/office/drawing/2014/main" id="{CB405F7F-B401-4556-A5B9-7CB80732A32D}"/>
+              </a:ext>
+            </a:extLst>
+          </p:cNvPr>
+          <p:cNvCxnSpPr>
+            <a:cxnSpLocks/>
+            <a:stCxn id="64" idx="0"/>
+            <a:endCxn id="72" idx="0"/>
+          </p:cNvCxnSpPr>
+          <p:nvPr/>
+        </p:nvCxnSpPr>
+        <p:spPr>
+          <a:xfrm>
+            <a:off x="3655751" y="4344380"/>
+            <a:ext cx="1723858" cy="396687"/>
+          </a:xfrm>
+          <a:prstGeom prst="straightConnector1">
+            <a:avLst/>
+          </a:prstGeom>
+          <a:ln>
+            <a:tailEnd type="triangle"/>
+          </a:ln>
+        </p:spPr>
+        <p:style>
+          <a:lnRef idx="1">
+            <a:schemeClr val="accent1"/>
+          </a:lnRef>
+          <a:fillRef idx="0">
+            <a:schemeClr val="accent1"/>
+          </a:fillRef>
+          <a:effectRef idx="0">
+            <a:schemeClr val="accent1"/>
+          </a:effectRef>
+          <a:fontRef idx="minor">
+            <a:schemeClr val="tx1"/>
+          </a:fontRef>
+        </p:style>
+      </p:cxnSp>
+      <p:cxnSp>
+        <p:nvCxnSpPr>
+          <p:cNvPr id="78" name="直接箭头连接符 77">
+            <a:extLst>
+              <a:ext uri="{FF2B5EF4-FFF2-40B4-BE49-F238E27FC236}">
+                <a16:creationId xmlns:a16="http://schemas.microsoft.com/office/drawing/2014/main" id="{FA155939-8DC3-438F-BEC4-4F49B6C1F13C}"/>
+              </a:ext>
+            </a:extLst>
+          </p:cNvPr>
+          <p:cNvCxnSpPr>
+            <a:cxnSpLocks/>
+            <a:stCxn id="64" idx="2"/>
+            <a:endCxn id="103" idx="0"/>
+          </p:cNvCxnSpPr>
+          <p:nvPr/>
+        </p:nvCxnSpPr>
+        <p:spPr>
+          <a:xfrm flipH="1">
+            <a:off x="1821176" y="5285009"/>
+            <a:ext cx="1834575" cy="485958"/>
+          </a:xfrm>
+          <a:prstGeom prst="straightConnector1">
+            <a:avLst/>
+          </a:prstGeom>
+          <a:ln>
+            <a:tailEnd type="triangle"/>
+          </a:ln>
+        </p:spPr>
+        <p:style>
+          <a:lnRef idx="1">
+            <a:schemeClr val="accent1"/>
+          </a:lnRef>
+          <a:fillRef idx="0">
+            <a:schemeClr val="accent1"/>
+          </a:fillRef>
+          <a:effectRef idx="0">
+            <a:schemeClr val="accent1"/>
+          </a:effectRef>
+          <a:fontRef idx="minor">
+            <a:schemeClr val="tx1"/>
+          </a:fontRef>
+        </p:style>
+      </p:cxnSp>
+      <p:sp>
+        <p:nvSpPr>
+          <p:cNvPr id="84" name="文本框 83">
+            <a:extLst>
+              <a:ext uri="{FF2B5EF4-FFF2-40B4-BE49-F238E27FC236}">
+                <a16:creationId xmlns:a16="http://schemas.microsoft.com/office/drawing/2014/main" id="{36BC3FC9-478E-472C-8B2D-07E6E30CD785}"/>
+              </a:ext>
+            </a:extLst>
+          </p:cNvPr>
+          <p:cNvSpPr txBox="1"/>
+          <p:nvPr/>
+        </p:nvSpPr>
+        <p:spPr>
+          <a:xfrm>
+            <a:off x="708768" y="4353080"/>
+            <a:ext cx="1440258" cy="307777"/>
+          </a:xfrm>
+          <a:prstGeom prst="rect">
+            <a:avLst/>
+          </a:prstGeom>
+          <a:noFill/>
+        </p:spPr>
+        <p:txBody>
+          <a:bodyPr wrap="square" rtlCol="0">
+            <a:spAutoFit/>
+          </a:bodyPr>
+          <a:lstStyle/>
+          <a:p>
+            <a:r>
+              <a:rPr lang="en-US" altLang="zh-CN" sz="1400" dirty="0"/>
+              <a:t>192.168.1.102</a:t>
+            </a:r>
+            <a:endParaRPr lang="zh-CN" altLang="en-US" sz="1400" dirty="0"/>
+          </a:p>
+        </p:txBody>
+      </p:sp>
+      <p:sp>
+        <p:nvSpPr>
+          <p:cNvPr id="86" name="文本框 85">
+            <a:extLst>
+              <a:ext uri="{FF2B5EF4-FFF2-40B4-BE49-F238E27FC236}">
+                <a16:creationId xmlns:a16="http://schemas.microsoft.com/office/drawing/2014/main" id="{038946FC-165D-4DA9-BB81-88003FD01C8D}"/>
+              </a:ext>
+            </a:extLst>
+          </p:cNvPr>
+          <p:cNvSpPr txBox="1"/>
+          <p:nvPr/>
+        </p:nvSpPr>
+        <p:spPr>
+          <a:xfrm>
+            <a:off x="2720882" y="5409809"/>
+            <a:ext cx="621660" cy="307777"/>
+          </a:xfrm>
+          <a:prstGeom prst="rect">
+            <a:avLst/>
+          </a:prstGeom>
+          <a:noFill/>
+        </p:spPr>
+        <p:txBody>
+          <a:bodyPr wrap="square" rtlCol="0">
+            <a:spAutoFit/>
+          </a:bodyPr>
+          <a:lstStyle/>
+          <a:p>
+            <a:r>
+              <a:rPr lang="en-US" altLang="zh-CN" sz="1400" dirty="0"/>
+              <a:t>8081</a:t>
+            </a:r>
+            <a:endParaRPr lang="zh-CN" altLang="en-US" sz="1400" dirty="0"/>
+          </a:p>
+        </p:txBody>
+      </p:sp>
+      <p:sp>
+        <p:nvSpPr>
+          <p:cNvPr id="103" name="矩形: 圆角 102">
+            <a:extLst>
+              <a:ext uri="{FF2B5EF4-FFF2-40B4-BE49-F238E27FC236}">
+                <a16:creationId xmlns:a16="http://schemas.microsoft.com/office/drawing/2014/main" id="{771B7E65-9AA6-4391-8140-DCDF95A5B8AD}"/>
+              </a:ext>
+            </a:extLst>
+          </p:cNvPr>
+          <p:cNvSpPr/>
+          <p:nvPr/>
+        </p:nvSpPr>
+        <p:spPr>
+          <a:xfrm>
+            <a:off x="408479" y="5770967"/>
+            <a:ext cx="2825397" cy="1665881"/>
+          </a:xfrm>
+          <a:prstGeom prst="roundRect">
+            <a:avLst/>
+          </a:prstGeom>
+          <a:solidFill>
+            <a:schemeClr val="accent2">
+              <a:lumMod val="40000"/>
+              <a:lumOff val="60000"/>
+            </a:schemeClr>
+          </a:solidFill>
+        </p:spPr>
+        <p:style>
+          <a:lnRef idx="2">
+            <a:schemeClr val="accent1">
+              <a:shade val="50000"/>
+            </a:schemeClr>
+          </a:lnRef>
+          <a:fillRef idx="1">
+            <a:schemeClr val="accent1"/>
+          </a:fillRef>
+          <a:effectRef idx="0">
+            <a:schemeClr val="accent1"/>
+          </a:effectRef>
+          <a:fontRef idx="minor">
+            <a:schemeClr val="lt1"/>
+          </a:fontRef>
+        </p:style>
+        <p:txBody>
+          <a:bodyPr rtlCol="0" anchor="ctr"/>
+          <a:lstStyle/>
+          <a:p>
+            <a:pPr algn="ctr"/>
+            <a:endParaRPr lang="zh-CN" altLang="en-US" dirty="0"/>
+          </a:p>
+        </p:txBody>
+      </p:sp>
+      <p:sp>
+        <p:nvSpPr>
+          <p:cNvPr id="104" name="矩形: 圆角 103">
+            <a:extLst>
+              <a:ext uri="{FF2B5EF4-FFF2-40B4-BE49-F238E27FC236}">
+                <a16:creationId xmlns:a16="http://schemas.microsoft.com/office/drawing/2014/main" id="{82176F10-C0AD-4A8A-A4E4-5028B1B0E132}"/>
+              </a:ext>
+            </a:extLst>
+          </p:cNvPr>
+          <p:cNvSpPr/>
+          <p:nvPr/>
+        </p:nvSpPr>
+        <p:spPr>
+          <a:xfrm>
+            <a:off x="687585" y="6220893"/>
+            <a:ext cx="2230754" cy="393932"/>
+          </a:xfrm>
+          <a:prstGeom prst="roundRect">
+            <a:avLst/>
+          </a:prstGeom>
+        </p:spPr>
+        <p:style>
+          <a:lnRef idx="2">
+            <a:schemeClr val="accent1">
+              <a:shade val="50000"/>
+            </a:schemeClr>
+          </a:lnRef>
+          <a:fillRef idx="1">
+            <a:schemeClr val="accent1"/>
+          </a:fillRef>
+          <a:effectRef idx="0">
+            <a:schemeClr val="accent1"/>
+          </a:effectRef>
+          <a:fontRef idx="minor">
+            <a:schemeClr val="lt1"/>
+          </a:fontRef>
+        </p:style>
+        <p:txBody>
+          <a:bodyPr rtlCol="0" anchor="ctr"/>
+          <a:lstStyle/>
+          <a:p>
+            <a:pPr algn="ctr"/>
+            <a:r>
+              <a:rPr lang="en-US" altLang="zh-CN" dirty="0"/>
+              <a:t>App01_vm01</a:t>
+            </a:r>
+            <a:endParaRPr lang="zh-CN" altLang="en-US" dirty="0"/>
+          </a:p>
+        </p:txBody>
+      </p:sp>
+      <p:sp>
+        <p:nvSpPr>
+          <p:cNvPr id="105" name="矩形: 圆角 104">
+            <a:extLst>
+              <a:ext uri="{FF2B5EF4-FFF2-40B4-BE49-F238E27FC236}">
+                <a16:creationId xmlns:a16="http://schemas.microsoft.com/office/drawing/2014/main" id="{176CF00B-40A0-4390-885D-0829BA6072B3}"/>
+              </a:ext>
+            </a:extLst>
+          </p:cNvPr>
+          <p:cNvSpPr/>
+          <p:nvPr/>
+        </p:nvSpPr>
+        <p:spPr>
+          <a:xfrm>
+            <a:off x="683037" y="6954138"/>
+            <a:ext cx="2238121" cy="393932"/>
+          </a:xfrm>
+          <a:prstGeom prst="roundRect">
+            <a:avLst/>
+          </a:prstGeom>
+        </p:spPr>
+        <p:style>
+          <a:lnRef idx="2">
+            <a:schemeClr val="accent1">
+              <a:shade val="50000"/>
+            </a:schemeClr>
+          </a:lnRef>
+          <a:fillRef idx="1">
+            <a:schemeClr val="accent1"/>
+          </a:fillRef>
+          <a:effectRef idx="0">
+            <a:schemeClr val="accent1"/>
+          </a:effectRef>
+          <a:fontRef idx="minor">
+            <a:schemeClr val="lt1"/>
+          </a:fontRef>
+        </p:style>
+        <p:txBody>
+          <a:bodyPr rtlCol="0" anchor="ctr"/>
+          <a:lstStyle/>
+          <a:p>
+            <a:pPr algn="ctr"/>
+            <a:r>
+              <a:rPr lang="en-US" altLang="zh-CN" dirty="0"/>
+              <a:t>App01_vm01</a:t>
+            </a:r>
+            <a:endParaRPr lang="zh-CN" altLang="en-US" dirty="0"/>
+          </a:p>
+        </p:txBody>
+      </p:sp>
+      <p:sp>
+        <p:nvSpPr>
+          <p:cNvPr id="106" name="文本框 105">
+            <a:extLst>
+              <a:ext uri="{FF2B5EF4-FFF2-40B4-BE49-F238E27FC236}">
+                <a16:creationId xmlns:a16="http://schemas.microsoft.com/office/drawing/2014/main" id="{4FB503FA-C5E6-4698-BAFD-FF681683921A}"/>
+              </a:ext>
+            </a:extLst>
+          </p:cNvPr>
+          <p:cNvSpPr txBox="1"/>
+          <p:nvPr/>
+        </p:nvSpPr>
+        <p:spPr>
+          <a:xfrm>
+            <a:off x="969781" y="5881198"/>
+            <a:ext cx="1713125" cy="307777"/>
+          </a:xfrm>
+          <a:prstGeom prst="rect">
+            <a:avLst/>
+          </a:prstGeom>
+          <a:noFill/>
+        </p:spPr>
+        <p:txBody>
+          <a:bodyPr wrap="square" rtlCol="0">
+            <a:spAutoFit/>
+          </a:bodyPr>
+          <a:lstStyle/>
+          <a:p>
+            <a:r>
+              <a:rPr lang="en-US" altLang="zh-CN" sz="1400" dirty="0"/>
+              <a:t>192.168.1.106:80</a:t>
+            </a:r>
+            <a:endParaRPr lang="zh-CN" altLang="en-US" sz="1400" dirty="0"/>
+          </a:p>
+        </p:txBody>
+      </p:sp>
+      <p:sp>
+        <p:nvSpPr>
+          <p:cNvPr id="107" name="文本框 106">
+            <a:extLst>
+              <a:ext uri="{FF2B5EF4-FFF2-40B4-BE49-F238E27FC236}">
+                <a16:creationId xmlns:a16="http://schemas.microsoft.com/office/drawing/2014/main" id="{DB88D74D-2718-4509-9763-48704B278EA7}"/>
+              </a:ext>
+            </a:extLst>
+          </p:cNvPr>
+          <p:cNvSpPr txBox="1"/>
+          <p:nvPr/>
+        </p:nvSpPr>
+        <p:spPr>
+          <a:xfrm>
+            <a:off x="964616" y="6603908"/>
+            <a:ext cx="1713125" cy="307777"/>
+          </a:xfrm>
+          <a:prstGeom prst="rect">
+            <a:avLst/>
+          </a:prstGeom>
+          <a:noFill/>
+        </p:spPr>
+        <p:txBody>
+          <a:bodyPr wrap="square" rtlCol="0">
+            <a:spAutoFit/>
+          </a:bodyPr>
+          <a:lstStyle/>
+          <a:p>
+            <a:r>
+              <a:rPr lang="en-US" altLang="zh-CN" sz="1400" dirty="0"/>
+              <a:t>192.168.1.108:80</a:t>
+            </a:r>
+            <a:endParaRPr lang="zh-CN" altLang="en-US" sz="1400" dirty="0"/>
+          </a:p>
+        </p:txBody>
+      </p:sp>
+      <p:sp>
+        <p:nvSpPr>
+          <p:cNvPr id="113" name="矩形: 圆角 112">
+            <a:extLst>
+              <a:ext uri="{FF2B5EF4-FFF2-40B4-BE49-F238E27FC236}">
+                <a16:creationId xmlns:a16="http://schemas.microsoft.com/office/drawing/2014/main" id="{ABEF01F7-A209-4A8F-9B3E-9B20F9610E9F}"/>
+              </a:ext>
+            </a:extLst>
+          </p:cNvPr>
+          <p:cNvSpPr/>
+          <p:nvPr/>
+        </p:nvSpPr>
+        <p:spPr>
+          <a:xfrm>
+            <a:off x="4003606" y="5770967"/>
+            <a:ext cx="2825397" cy="1665881"/>
+          </a:xfrm>
+          <a:prstGeom prst="roundRect">
+            <a:avLst/>
+          </a:prstGeom>
+          <a:solidFill>
+            <a:schemeClr val="accent2">
+              <a:lumMod val="40000"/>
+              <a:lumOff val="60000"/>
+            </a:schemeClr>
+          </a:solidFill>
+        </p:spPr>
+        <p:style>
+          <a:lnRef idx="2">
+            <a:schemeClr val="accent1">
+              <a:shade val="50000"/>
+            </a:schemeClr>
+          </a:lnRef>
+          <a:fillRef idx="1">
+            <a:schemeClr val="accent1"/>
+          </a:fillRef>
+          <a:effectRef idx="0">
+            <a:schemeClr val="accent1"/>
+          </a:effectRef>
+          <a:fontRef idx="minor">
+            <a:schemeClr val="lt1"/>
+          </a:fontRef>
+        </p:style>
+        <p:txBody>
+          <a:bodyPr rtlCol="0" anchor="ctr"/>
+          <a:lstStyle/>
+          <a:p>
+            <a:pPr algn="ctr"/>
+            <a:endParaRPr lang="zh-CN" altLang="en-US" dirty="0"/>
+          </a:p>
+        </p:txBody>
+      </p:sp>
+      <p:sp>
+        <p:nvSpPr>
+          <p:cNvPr id="114" name="矩形: 圆角 113">
+            <a:extLst>
+              <a:ext uri="{FF2B5EF4-FFF2-40B4-BE49-F238E27FC236}">
+                <a16:creationId xmlns:a16="http://schemas.microsoft.com/office/drawing/2014/main" id="{C90914D4-A271-42C7-88F5-A224A50AD2FB}"/>
+              </a:ext>
+            </a:extLst>
+          </p:cNvPr>
+          <p:cNvSpPr/>
+          <p:nvPr/>
+        </p:nvSpPr>
+        <p:spPr>
+          <a:xfrm>
+            <a:off x="4282712" y="6220893"/>
+            <a:ext cx="2230754" cy="393932"/>
+          </a:xfrm>
+          <a:prstGeom prst="roundRect">
+            <a:avLst/>
+          </a:prstGeom>
+        </p:spPr>
+        <p:style>
+          <a:lnRef idx="2">
+            <a:schemeClr val="accent1">
+              <a:shade val="50000"/>
+            </a:schemeClr>
+          </a:lnRef>
+          <a:fillRef idx="1">
+            <a:schemeClr val="accent1"/>
+          </a:fillRef>
+          <a:effectRef idx="0">
+            <a:schemeClr val="accent1"/>
+          </a:effectRef>
+          <a:fontRef idx="minor">
+            <a:schemeClr val="lt1"/>
+          </a:fontRef>
+        </p:style>
+        <p:txBody>
+          <a:bodyPr rtlCol="0" anchor="ctr"/>
+          <a:lstStyle/>
+          <a:p>
+            <a:pPr algn="ctr"/>
+            <a:r>
+              <a:rPr lang="en-US" altLang="zh-CN" dirty="0"/>
+              <a:t>App02_vm01</a:t>
+            </a:r>
+            <a:endParaRPr lang="zh-CN" altLang="en-US" dirty="0"/>
+          </a:p>
+        </p:txBody>
+      </p:sp>
+      <p:sp>
+        <p:nvSpPr>
+          <p:cNvPr id="115" name="矩形: 圆角 114">
+            <a:extLst>
+              <a:ext uri="{FF2B5EF4-FFF2-40B4-BE49-F238E27FC236}">
+                <a16:creationId xmlns:a16="http://schemas.microsoft.com/office/drawing/2014/main" id="{6A07D90B-4A55-473C-944F-1BB9BD2C0D58}"/>
+              </a:ext>
+            </a:extLst>
+          </p:cNvPr>
+          <p:cNvSpPr/>
+          <p:nvPr/>
+        </p:nvSpPr>
+        <p:spPr>
+          <a:xfrm>
+            <a:off x="4278164" y="6954138"/>
+            <a:ext cx="2238121" cy="393932"/>
+          </a:xfrm>
+          <a:prstGeom prst="roundRect">
+            <a:avLst/>
+          </a:prstGeom>
+        </p:spPr>
+        <p:style>
+          <a:lnRef idx="2">
+            <a:schemeClr val="accent1">
+              <a:shade val="50000"/>
+            </a:schemeClr>
+          </a:lnRef>
+          <a:fillRef idx="1">
+            <a:schemeClr val="accent1"/>
+          </a:fillRef>
+          <a:effectRef idx="0">
+            <a:schemeClr val="accent1"/>
+          </a:effectRef>
+          <a:fontRef idx="minor">
+            <a:schemeClr val="lt1"/>
+          </a:fontRef>
+        </p:style>
+        <p:txBody>
+          <a:bodyPr rtlCol="0" anchor="ctr"/>
+          <a:lstStyle/>
+          <a:p>
+            <a:pPr algn="ctr"/>
+            <a:r>
+              <a:rPr lang="en-US" altLang="zh-CN" dirty="0"/>
+              <a:t>App02_vm01</a:t>
+            </a:r>
+            <a:endParaRPr lang="zh-CN" altLang="en-US" dirty="0"/>
+          </a:p>
+        </p:txBody>
+      </p:sp>
+      <p:sp>
+        <p:nvSpPr>
+          <p:cNvPr id="116" name="文本框 115">
+            <a:extLst>
+              <a:ext uri="{FF2B5EF4-FFF2-40B4-BE49-F238E27FC236}">
+                <a16:creationId xmlns:a16="http://schemas.microsoft.com/office/drawing/2014/main" id="{2A92ABFA-5E0A-4DB4-B408-1B405A8A7217}"/>
+              </a:ext>
+            </a:extLst>
+          </p:cNvPr>
+          <p:cNvSpPr txBox="1"/>
+          <p:nvPr/>
+        </p:nvSpPr>
+        <p:spPr>
+          <a:xfrm>
+            <a:off x="4564908" y="5881198"/>
+            <a:ext cx="1713125" cy="307777"/>
+          </a:xfrm>
+          <a:prstGeom prst="rect">
+            <a:avLst/>
+          </a:prstGeom>
+          <a:noFill/>
+        </p:spPr>
+        <p:txBody>
+          <a:bodyPr wrap="square" rtlCol="0">
+            <a:spAutoFit/>
+          </a:bodyPr>
+          <a:lstStyle/>
+          <a:p>
+            <a:r>
+              <a:rPr lang="en-US" altLang="zh-CN" sz="1400" dirty="0"/>
+              <a:t>192.168.1.107:80</a:t>
+            </a:r>
+            <a:endParaRPr lang="zh-CN" altLang="en-US" sz="1400" dirty="0"/>
+          </a:p>
+        </p:txBody>
+      </p:sp>
+      <p:sp>
+        <p:nvSpPr>
+          <p:cNvPr id="117" name="文本框 116">
+            <a:extLst>
+              <a:ext uri="{FF2B5EF4-FFF2-40B4-BE49-F238E27FC236}">
+                <a16:creationId xmlns:a16="http://schemas.microsoft.com/office/drawing/2014/main" id="{77F89E21-3D9E-49E3-8D0A-E7E223E8230C}"/>
+              </a:ext>
+            </a:extLst>
+          </p:cNvPr>
+          <p:cNvSpPr txBox="1"/>
+          <p:nvPr/>
+        </p:nvSpPr>
+        <p:spPr>
+          <a:xfrm>
+            <a:off x="4559743" y="6603908"/>
+            <a:ext cx="1713125" cy="307777"/>
+          </a:xfrm>
+          <a:prstGeom prst="rect">
+            <a:avLst/>
+          </a:prstGeom>
+          <a:noFill/>
+        </p:spPr>
+        <p:txBody>
+          <a:bodyPr wrap="square" rtlCol="0">
+            <a:spAutoFit/>
+          </a:bodyPr>
+          <a:lstStyle/>
+          <a:p>
+            <a:r>
+              <a:rPr lang="en-US" altLang="zh-CN" sz="1400" dirty="0"/>
+              <a:t>192.168.1.109:80</a:t>
+            </a:r>
+            <a:endParaRPr lang="zh-CN" altLang="en-US" sz="1400" dirty="0"/>
+          </a:p>
+        </p:txBody>
+      </p:sp>
+      <p:cxnSp>
+        <p:nvCxnSpPr>
+          <p:cNvPr id="120" name="直接箭头连接符 119">
+            <a:extLst>
+              <a:ext uri="{FF2B5EF4-FFF2-40B4-BE49-F238E27FC236}">
+                <a16:creationId xmlns:a16="http://schemas.microsoft.com/office/drawing/2014/main" id="{E3C9C86B-E268-4CAC-AEE3-0F45D3DC4A4A}"/>
+              </a:ext>
+            </a:extLst>
+          </p:cNvPr>
+          <p:cNvCxnSpPr>
+            <a:stCxn id="64" idx="2"/>
+            <a:endCxn id="113" idx="0"/>
+          </p:cNvCxnSpPr>
+          <p:nvPr/>
+        </p:nvCxnSpPr>
+        <p:spPr>
+          <a:xfrm>
+            <a:off x="3655751" y="5285009"/>
+            <a:ext cx="1760552" cy="485958"/>
+          </a:xfrm>
+          <a:prstGeom prst="straightConnector1">
+            <a:avLst/>
+          </a:prstGeom>
+          <a:ln>
+            <a:tailEnd type="triangle"/>
+          </a:ln>
+        </p:spPr>
+        <p:style>
+          <a:lnRef idx="1">
+            <a:schemeClr val="accent1"/>
+          </a:lnRef>
+          <a:fillRef idx="0">
+            <a:schemeClr val="accent1"/>
+          </a:fillRef>
+          <a:effectRef idx="0">
+            <a:schemeClr val="accent1"/>
+          </a:effectRef>
+          <a:fontRef idx="minor">
+            <a:schemeClr val="tx1"/>
+          </a:fontRef>
+        </p:style>
+      </p:cxnSp>
+      <p:sp>
+        <p:nvSpPr>
+          <p:cNvPr id="121" name="文本框 120">
+            <a:extLst>
+              <a:ext uri="{FF2B5EF4-FFF2-40B4-BE49-F238E27FC236}">
+                <a16:creationId xmlns:a16="http://schemas.microsoft.com/office/drawing/2014/main" id="{E3B50558-2C99-43A4-A6EA-AE23554A90C9}"/>
+              </a:ext>
+            </a:extLst>
+          </p:cNvPr>
+          <p:cNvSpPr txBox="1"/>
+          <p:nvPr/>
+        </p:nvSpPr>
+        <p:spPr>
+          <a:xfrm>
+            <a:off x="4002488" y="5420734"/>
+            <a:ext cx="621660" cy="307777"/>
+          </a:xfrm>
+          <a:prstGeom prst="rect">
+            <a:avLst/>
+          </a:prstGeom>
+          <a:noFill/>
+        </p:spPr>
+        <p:txBody>
+          <a:bodyPr wrap="square" rtlCol="0">
+            <a:spAutoFit/>
+          </a:bodyPr>
+          <a:lstStyle/>
+          <a:p>
+            <a:r>
+              <a:rPr lang="en-US" altLang="zh-CN" sz="1400" dirty="0"/>
+              <a:t>8082</a:t>
+            </a:r>
+            <a:endParaRPr lang="zh-CN" altLang="en-US" sz="1400" dirty="0"/>
+          </a:p>
+        </p:txBody>
+      </p:sp>
+      <p:sp>
+        <p:nvSpPr>
+          <p:cNvPr id="55" name="矩形: 圆角 54">
+            <a:extLst>
+              <a:ext uri="{FF2B5EF4-FFF2-40B4-BE49-F238E27FC236}">
+                <a16:creationId xmlns:a16="http://schemas.microsoft.com/office/drawing/2014/main" id="{A3C6E439-94CC-4FE6-B318-1D04C6580DC6}"/>
+              </a:ext>
+            </a:extLst>
+          </p:cNvPr>
+          <p:cNvSpPr/>
+          <p:nvPr/>
+        </p:nvSpPr>
+        <p:spPr>
+          <a:xfrm>
+            <a:off x="7231833" y="4347272"/>
+            <a:ext cx="6494548" cy="940631"/>
+          </a:xfrm>
+          <a:prstGeom prst="roundRect">
+            <a:avLst/>
+          </a:prstGeom>
+          <a:solidFill>
+            <a:schemeClr val="accent2">
+              <a:lumMod val="20000"/>
+              <a:lumOff val="80000"/>
+            </a:schemeClr>
+          </a:solidFill>
+        </p:spPr>
+        <p:style>
+          <a:lnRef idx="2">
+            <a:schemeClr val="accent1">
+              <a:shade val="50000"/>
+            </a:schemeClr>
+          </a:lnRef>
+          <a:fillRef idx="1">
+            <a:schemeClr val="accent1"/>
+          </a:fillRef>
+          <a:effectRef idx="0">
+            <a:schemeClr val="accent1"/>
+          </a:effectRef>
+          <a:fontRef idx="minor">
+            <a:schemeClr val="lt1"/>
+          </a:fontRef>
+        </p:style>
+        <p:txBody>
+          <a:bodyPr rtlCol="0" anchor="ctr"/>
+          <a:lstStyle/>
+          <a:p>
+            <a:pPr algn="ctr"/>
+            <a:endParaRPr lang="zh-CN" altLang="en-US"/>
+          </a:p>
+        </p:txBody>
+      </p:sp>
+      <p:sp>
+        <p:nvSpPr>
+          <p:cNvPr id="56" name="矩形: 圆角 55">
+            <a:extLst>
+              <a:ext uri="{FF2B5EF4-FFF2-40B4-BE49-F238E27FC236}">
+                <a16:creationId xmlns:a16="http://schemas.microsoft.com/office/drawing/2014/main" id="{3D3E34F1-7A41-4905-8FFE-10437B65DEAA}"/>
+              </a:ext>
+            </a:extLst>
+          </p:cNvPr>
+          <p:cNvSpPr/>
+          <p:nvPr/>
+        </p:nvSpPr>
+        <p:spPr>
+          <a:xfrm>
+            <a:off x="7443979" y="4743958"/>
+            <a:ext cx="2754240" cy="393932"/>
+          </a:xfrm>
+          <a:prstGeom prst="roundRect">
+            <a:avLst/>
+          </a:prstGeom>
+        </p:spPr>
+        <p:style>
+          <a:lnRef idx="2">
+            <a:schemeClr val="accent1">
+              <a:shade val="50000"/>
+            </a:schemeClr>
+          </a:lnRef>
+          <a:fillRef idx="1">
+            <a:schemeClr val="accent1"/>
+          </a:fillRef>
+          <a:effectRef idx="0">
+            <a:schemeClr val="accent1"/>
+          </a:effectRef>
+          <a:fontRef idx="minor">
+            <a:schemeClr val="lt1"/>
+          </a:fontRef>
+        </p:style>
+        <p:txBody>
+          <a:bodyPr rtlCol="0" anchor="ctr"/>
+          <a:lstStyle/>
+          <a:p>
+            <a:pPr algn="ctr"/>
+            <a:r>
+              <a:rPr lang="en-US" altLang="zh-CN" dirty="0"/>
+              <a:t>HAProxy+KeepAlived</a:t>
+            </a:r>
+            <a:endParaRPr lang="zh-CN" altLang="en-US" dirty="0"/>
+          </a:p>
+        </p:txBody>
+      </p:sp>
+      <p:sp>
+        <p:nvSpPr>
+          <p:cNvPr id="57" name="矩形: 圆角 56">
+            <a:extLst>
+              <a:ext uri="{FF2B5EF4-FFF2-40B4-BE49-F238E27FC236}">
+                <a16:creationId xmlns:a16="http://schemas.microsoft.com/office/drawing/2014/main" id="{481FB2FB-82B3-4A67-B86F-7EF6543AC7F8}"/>
+              </a:ext>
+            </a:extLst>
+          </p:cNvPr>
+          <p:cNvSpPr/>
+          <p:nvPr/>
+        </p:nvSpPr>
+        <p:spPr>
+          <a:xfrm>
+            <a:off x="10825846" y="4743957"/>
+            <a:ext cx="2754240" cy="393932"/>
+          </a:xfrm>
+          <a:prstGeom prst="roundRect">
+            <a:avLst/>
+          </a:prstGeom>
+        </p:spPr>
+        <p:style>
+          <a:lnRef idx="2">
+            <a:schemeClr val="accent1">
+              <a:shade val="50000"/>
+            </a:schemeClr>
+          </a:lnRef>
+          <a:fillRef idx="1">
+            <a:schemeClr val="accent1"/>
+          </a:fillRef>
+          <a:effectRef idx="0">
+            <a:schemeClr val="accent1"/>
+          </a:effectRef>
+          <a:fontRef idx="minor">
+            <a:schemeClr val="lt1"/>
+          </a:fontRef>
+        </p:style>
+        <p:txBody>
+          <a:bodyPr rtlCol="0" anchor="ctr"/>
+          <a:lstStyle/>
+          <a:p>
+            <a:pPr algn="ctr"/>
+            <a:r>
+              <a:rPr lang="en-US" altLang="zh-CN" dirty="0"/>
+              <a:t>HAProxy+KeepAlived</a:t>
+            </a:r>
+            <a:endParaRPr lang="zh-CN" altLang="en-US" dirty="0"/>
+          </a:p>
+        </p:txBody>
+      </p:sp>
+      <p:sp>
+        <p:nvSpPr>
+          <p:cNvPr id="58" name="文本框 57">
+            <a:extLst>
+              <a:ext uri="{FF2B5EF4-FFF2-40B4-BE49-F238E27FC236}">
+                <a16:creationId xmlns:a16="http://schemas.microsoft.com/office/drawing/2014/main" id="{F27DCE04-DAD0-491E-A8AF-01732D57142B}"/>
+              </a:ext>
+            </a:extLst>
+          </p:cNvPr>
+          <p:cNvSpPr txBox="1"/>
+          <p:nvPr/>
+        </p:nvSpPr>
+        <p:spPr>
+          <a:xfrm>
+            <a:off x="9232685" y="3901566"/>
+            <a:ext cx="1868837" cy="307777"/>
+          </a:xfrm>
+          <a:prstGeom prst="rect">
+            <a:avLst/>
+          </a:prstGeom>
+          <a:noFill/>
+        </p:spPr>
+        <p:txBody>
+          <a:bodyPr wrap="square" rtlCol="0">
+            <a:spAutoFit/>
+          </a:bodyPr>
+          <a:lstStyle/>
+          <a:p>
+            <a:r>
+              <a:rPr lang="en-US" altLang="zh-CN" sz="1400" b="1" dirty="0">
+                <a:solidFill>
+                  <a:srgbClr val="FF0000"/>
+                </a:solidFill>
+              </a:rPr>
+              <a:t>VIP</a:t>
+            </a:r>
+            <a:r>
+              <a:rPr lang="en-US" altLang="zh-CN" sz="1400" dirty="0">
+                <a:solidFill>
+                  <a:srgbClr val="FF0000"/>
+                </a:solidFill>
+              </a:rPr>
+              <a:t>: 192.168.1.104</a:t>
+            </a:r>
+            <a:endParaRPr lang="zh-CN" altLang="en-US" sz="1400" dirty="0">
+              <a:solidFill>
+                <a:srgbClr val="FF0000"/>
+              </a:solidFill>
+            </a:endParaRPr>
+          </a:p>
+        </p:txBody>
+      </p:sp>
+      <p:sp>
+        <p:nvSpPr>
+          <p:cNvPr id="59" name="文本框 58">
+            <a:extLst>
+              <a:ext uri="{FF2B5EF4-FFF2-40B4-BE49-F238E27FC236}">
+                <a16:creationId xmlns:a16="http://schemas.microsoft.com/office/drawing/2014/main" id="{E0C5DDE6-DAC1-4DEA-9439-2CC4C21832B4}"/>
+              </a:ext>
+            </a:extLst>
+          </p:cNvPr>
+          <p:cNvSpPr txBox="1"/>
+          <p:nvPr/>
+        </p:nvSpPr>
+        <p:spPr>
+          <a:xfrm>
+            <a:off x="12052296" y="4362428"/>
+            <a:ext cx="1440258" cy="307777"/>
+          </a:xfrm>
+          <a:prstGeom prst="rect">
+            <a:avLst/>
+          </a:prstGeom>
+          <a:noFill/>
+        </p:spPr>
+        <p:txBody>
+          <a:bodyPr wrap="square" rtlCol="0">
+            <a:spAutoFit/>
+          </a:bodyPr>
+          <a:lstStyle/>
+          <a:p>
+            <a:r>
+              <a:rPr lang="en-US" altLang="zh-CN" sz="1400" dirty="0"/>
+              <a:t>192.168.1.113</a:t>
+            </a:r>
+            <a:endParaRPr lang="zh-CN" altLang="en-US" sz="1400" dirty="0"/>
+          </a:p>
+        </p:txBody>
+      </p:sp>
+      <p:cxnSp>
+        <p:nvCxnSpPr>
+          <p:cNvPr id="60" name="直接箭头连接符 59">
+            <a:extLst>
+              <a:ext uri="{FF2B5EF4-FFF2-40B4-BE49-F238E27FC236}">
+                <a16:creationId xmlns:a16="http://schemas.microsoft.com/office/drawing/2014/main" id="{D40FF687-9F88-4CC8-96D1-87BF414E1EF9}"/>
+              </a:ext>
+            </a:extLst>
+          </p:cNvPr>
+          <p:cNvCxnSpPr>
+            <a:cxnSpLocks/>
+            <a:stCxn id="55" idx="0"/>
+            <a:endCxn id="56" idx="0"/>
+          </p:cNvCxnSpPr>
+          <p:nvPr/>
+        </p:nvCxnSpPr>
+        <p:spPr>
+          <a:xfrm flipH="1">
+            <a:off x="8821100" y="4347270"/>
+            <a:ext cx="1658009" cy="396688"/>
+          </a:xfrm>
+          <a:prstGeom prst="straightConnector1">
+            <a:avLst/>
+          </a:prstGeom>
+          <a:ln>
+            <a:tailEnd type="triangle"/>
+          </a:ln>
+        </p:spPr>
+        <p:style>
+          <a:lnRef idx="1">
+            <a:schemeClr val="accent1"/>
+          </a:lnRef>
+          <a:fillRef idx="0">
+            <a:schemeClr val="accent1"/>
+          </a:fillRef>
+          <a:effectRef idx="0">
+            <a:schemeClr val="accent1"/>
+          </a:effectRef>
+          <a:fontRef idx="minor">
+            <a:schemeClr val="tx1"/>
+          </a:fontRef>
+        </p:style>
+      </p:cxnSp>
+      <p:cxnSp>
+        <p:nvCxnSpPr>
+          <p:cNvPr id="61" name="直接箭头连接符 60">
+            <a:extLst>
+              <a:ext uri="{FF2B5EF4-FFF2-40B4-BE49-F238E27FC236}">
+                <a16:creationId xmlns:a16="http://schemas.microsoft.com/office/drawing/2014/main" id="{B6A1C168-8585-4C1F-AB04-152D497FB932}"/>
+              </a:ext>
+            </a:extLst>
+          </p:cNvPr>
+          <p:cNvCxnSpPr>
+            <a:cxnSpLocks/>
+            <a:stCxn id="55" idx="0"/>
+            <a:endCxn id="57" idx="0"/>
+          </p:cNvCxnSpPr>
+          <p:nvPr/>
+        </p:nvCxnSpPr>
+        <p:spPr>
+          <a:xfrm>
+            <a:off x="10479109" y="4347274"/>
+            <a:ext cx="1723858" cy="396687"/>
+          </a:xfrm>
+          <a:prstGeom prst="straightConnector1">
+            <a:avLst/>
+          </a:prstGeom>
+          <a:ln>
+            <a:tailEnd type="triangle"/>
+          </a:ln>
+        </p:spPr>
+        <p:style>
+          <a:lnRef idx="1">
+            <a:schemeClr val="accent1"/>
+          </a:lnRef>
+          <a:fillRef idx="0">
+            <a:schemeClr val="accent1"/>
+          </a:fillRef>
+          <a:effectRef idx="0">
+            <a:schemeClr val="accent1"/>
+          </a:effectRef>
+          <a:fontRef idx="minor">
+            <a:schemeClr val="tx1"/>
+          </a:fontRef>
+        </p:style>
+      </p:cxnSp>
+      <p:cxnSp>
+        <p:nvCxnSpPr>
+          <p:cNvPr id="62" name="直接箭头连接符 61">
+            <a:extLst>
+              <a:ext uri="{FF2B5EF4-FFF2-40B4-BE49-F238E27FC236}">
+                <a16:creationId xmlns:a16="http://schemas.microsoft.com/office/drawing/2014/main" id="{8223101D-F057-434E-895A-1F82B53C1DDE}"/>
+              </a:ext>
+            </a:extLst>
+          </p:cNvPr>
+          <p:cNvCxnSpPr>
+            <a:cxnSpLocks/>
+            <a:stCxn id="55" idx="2"/>
+            <a:endCxn id="66" idx="0"/>
+          </p:cNvCxnSpPr>
+          <p:nvPr/>
+        </p:nvCxnSpPr>
+        <p:spPr>
+          <a:xfrm flipH="1">
+            <a:off x="8644534" y="5287903"/>
+            <a:ext cx="1834575" cy="485958"/>
+          </a:xfrm>
+          <a:prstGeom prst="straightConnector1">
+            <a:avLst/>
+          </a:prstGeom>
+          <a:ln>
+            <a:tailEnd type="triangle"/>
+          </a:ln>
+        </p:spPr>
+        <p:style>
+          <a:lnRef idx="1">
+            <a:schemeClr val="accent1"/>
+          </a:lnRef>
+          <a:fillRef idx="0">
+            <a:schemeClr val="accent1"/>
+          </a:fillRef>
+          <a:effectRef idx="0">
+            <a:schemeClr val="accent1"/>
+          </a:effectRef>
+          <a:fontRef idx="minor">
+            <a:schemeClr val="tx1"/>
+          </a:fontRef>
+        </p:style>
+      </p:cxnSp>
+      <p:sp>
+        <p:nvSpPr>
+          <p:cNvPr id="63" name="文本框 62">
+            <a:extLst>
+              <a:ext uri="{FF2B5EF4-FFF2-40B4-BE49-F238E27FC236}">
+                <a16:creationId xmlns:a16="http://schemas.microsoft.com/office/drawing/2014/main" id="{F44AB7D4-453A-49B7-8D90-5AB529EF6ACC}"/>
+              </a:ext>
+            </a:extLst>
+          </p:cNvPr>
+          <p:cNvSpPr txBox="1"/>
+          <p:nvPr/>
+        </p:nvSpPr>
+        <p:spPr>
+          <a:xfrm>
+            <a:off x="7532126" y="4355974"/>
+            <a:ext cx="1440258" cy="307777"/>
+          </a:xfrm>
+          <a:prstGeom prst="rect">
+            <a:avLst/>
+          </a:prstGeom>
+          <a:noFill/>
+        </p:spPr>
+        <p:txBody>
+          <a:bodyPr wrap="square" rtlCol="0">
+            <a:spAutoFit/>
+          </a:bodyPr>
+          <a:lstStyle/>
+          <a:p>
+            <a:r>
+              <a:rPr lang="en-US" altLang="zh-CN" sz="1400" dirty="0"/>
+              <a:t>192.168.1.112</a:t>
+            </a:r>
+            <a:endParaRPr lang="zh-CN" altLang="en-US" sz="1400" dirty="0"/>
+          </a:p>
+        </p:txBody>
+      </p:sp>
+      <p:sp>
+        <p:nvSpPr>
+          <p:cNvPr id="65" name="文本框 64">
+            <a:extLst>
+              <a:ext uri="{FF2B5EF4-FFF2-40B4-BE49-F238E27FC236}">
+                <a16:creationId xmlns:a16="http://schemas.microsoft.com/office/drawing/2014/main" id="{C2D6A89C-3502-41D6-A1A2-80D4EB1D074D}"/>
+              </a:ext>
+            </a:extLst>
+          </p:cNvPr>
+          <p:cNvSpPr txBox="1"/>
+          <p:nvPr/>
+        </p:nvSpPr>
+        <p:spPr>
+          <a:xfrm>
+            <a:off x="9544240" y="5412703"/>
+            <a:ext cx="621660" cy="307777"/>
+          </a:xfrm>
+          <a:prstGeom prst="rect">
+            <a:avLst/>
+          </a:prstGeom>
+          <a:noFill/>
+        </p:spPr>
+        <p:txBody>
+          <a:bodyPr wrap="square" rtlCol="0">
+            <a:spAutoFit/>
+          </a:bodyPr>
+          <a:lstStyle/>
+          <a:p>
+            <a:r>
+              <a:rPr lang="en-US" altLang="zh-CN" sz="1400" dirty="0"/>
+              <a:t>8081</a:t>
+            </a:r>
+            <a:endParaRPr lang="zh-CN" altLang="en-US" sz="1400" dirty="0"/>
+          </a:p>
+        </p:txBody>
+      </p:sp>
+      <p:sp>
+        <p:nvSpPr>
+          <p:cNvPr id="66" name="矩形: 圆角 65">
+            <a:extLst>
+              <a:ext uri="{FF2B5EF4-FFF2-40B4-BE49-F238E27FC236}">
+                <a16:creationId xmlns:a16="http://schemas.microsoft.com/office/drawing/2014/main" id="{3A57E46D-A59E-49D3-B4A8-078A68F2B8FA}"/>
+              </a:ext>
+            </a:extLst>
+          </p:cNvPr>
+          <p:cNvSpPr/>
+          <p:nvPr/>
+        </p:nvSpPr>
+        <p:spPr>
+          <a:xfrm>
+            <a:off x="7231837" y="5773861"/>
+            <a:ext cx="2825397" cy="1665881"/>
+          </a:xfrm>
+          <a:prstGeom prst="roundRect">
+            <a:avLst/>
+          </a:prstGeom>
+          <a:solidFill>
+            <a:schemeClr val="accent2">
+              <a:lumMod val="40000"/>
+              <a:lumOff val="60000"/>
+            </a:schemeClr>
+          </a:solidFill>
+        </p:spPr>
+        <p:style>
+          <a:lnRef idx="2">
+            <a:schemeClr val="accent1">
+              <a:shade val="50000"/>
+            </a:schemeClr>
+          </a:lnRef>
+          <a:fillRef idx="1">
+            <a:schemeClr val="accent1"/>
+          </a:fillRef>
+          <a:effectRef idx="0">
+            <a:schemeClr val="accent1"/>
+          </a:effectRef>
+          <a:fontRef idx="minor">
+            <a:schemeClr val="lt1"/>
+          </a:fontRef>
+        </p:style>
+        <p:txBody>
+          <a:bodyPr rtlCol="0" anchor="ctr"/>
+          <a:lstStyle/>
+          <a:p>
+            <a:pPr algn="ctr"/>
+            <a:endParaRPr lang="zh-CN" altLang="en-US" dirty="0"/>
+          </a:p>
+        </p:txBody>
+      </p:sp>
+      <p:sp>
+        <p:nvSpPr>
+          <p:cNvPr id="67" name="矩形: 圆角 66">
+            <a:extLst>
+              <a:ext uri="{FF2B5EF4-FFF2-40B4-BE49-F238E27FC236}">
+                <a16:creationId xmlns:a16="http://schemas.microsoft.com/office/drawing/2014/main" id="{54F5DCB9-221B-40AF-8109-27F6A74B3EA6}"/>
+              </a:ext>
+            </a:extLst>
+          </p:cNvPr>
+          <p:cNvSpPr/>
+          <p:nvPr/>
+        </p:nvSpPr>
+        <p:spPr>
+          <a:xfrm>
+            <a:off x="7510943" y="6223787"/>
+            <a:ext cx="2230754" cy="393932"/>
+          </a:xfrm>
+          <a:prstGeom prst="roundRect">
+            <a:avLst/>
+          </a:prstGeom>
+        </p:spPr>
+        <p:style>
+          <a:lnRef idx="2">
+            <a:schemeClr val="accent1">
+              <a:shade val="50000"/>
+            </a:schemeClr>
+          </a:lnRef>
+          <a:fillRef idx="1">
+            <a:schemeClr val="accent1"/>
+          </a:fillRef>
+          <a:effectRef idx="0">
+            <a:schemeClr val="accent1"/>
+          </a:effectRef>
+          <a:fontRef idx="minor">
+            <a:schemeClr val="lt1"/>
+          </a:fontRef>
+        </p:style>
+        <p:txBody>
+          <a:bodyPr rtlCol="0" anchor="ctr"/>
+          <a:lstStyle/>
+          <a:p>
+            <a:pPr algn="ctr"/>
+            <a:r>
+              <a:rPr lang="en-US" altLang="zh-CN" dirty="0"/>
+              <a:t>App03_vm01</a:t>
+            </a:r>
+            <a:endParaRPr lang="zh-CN" altLang="en-US" dirty="0"/>
+          </a:p>
+        </p:txBody>
+      </p:sp>
+      <p:sp>
+        <p:nvSpPr>
+          <p:cNvPr id="68" name="矩形: 圆角 67">
+            <a:extLst>
+              <a:ext uri="{FF2B5EF4-FFF2-40B4-BE49-F238E27FC236}">
+                <a16:creationId xmlns:a16="http://schemas.microsoft.com/office/drawing/2014/main" id="{95F6838C-A440-4758-8AC2-BC8BABF999F8}"/>
+              </a:ext>
+            </a:extLst>
+          </p:cNvPr>
+          <p:cNvSpPr/>
+          <p:nvPr/>
+        </p:nvSpPr>
+        <p:spPr>
+          <a:xfrm>
+            <a:off x="7506395" y="6957032"/>
+            <a:ext cx="2238121" cy="393932"/>
+          </a:xfrm>
+          <a:prstGeom prst="roundRect">
+            <a:avLst/>
+          </a:prstGeom>
+        </p:spPr>
+        <p:style>
+          <a:lnRef idx="2">
+            <a:schemeClr val="accent1">
+              <a:shade val="50000"/>
+            </a:schemeClr>
+          </a:lnRef>
+          <a:fillRef idx="1">
+            <a:schemeClr val="accent1"/>
+          </a:fillRef>
+          <a:effectRef idx="0">
+            <a:schemeClr val="accent1"/>
+          </a:effectRef>
+          <a:fontRef idx="minor">
+            <a:schemeClr val="lt1"/>
+          </a:fontRef>
+        </p:style>
+        <p:txBody>
+          <a:bodyPr rtlCol="0" anchor="ctr"/>
+          <a:lstStyle/>
+          <a:p>
+            <a:pPr algn="ctr"/>
+            <a:r>
+              <a:rPr lang="en-US" altLang="zh-CN" dirty="0"/>
+              <a:t>App03_vm01</a:t>
+            </a:r>
+            <a:endParaRPr lang="zh-CN" altLang="en-US" dirty="0"/>
+          </a:p>
+        </p:txBody>
+      </p:sp>
+      <p:sp>
+        <p:nvSpPr>
+          <p:cNvPr id="74" name="文本框 73">
+            <a:extLst>
+              <a:ext uri="{FF2B5EF4-FFF2-40B4-BE49-F238E27FC236}">
+                <a16:creationId xmlns:a16="http://schemas.microsoft.com/office/drawing/2014/main" id="{D5894A3F-377D-43EE-A2C3-61F956558F61}"/>
+              </a:ext>
+            </a:extLst>
+          </p:cNvPr>
+          <p:cNvSpPr txBox="1"/>
+          <p:nvPr/>
+        </p:nvSpPr>
+        <p:spPr>
+          <a:xfrm>
+            <a:off x="7793139" y="5884092"/>
+            <a:ext cx="1713125" cy="307777"/>
+          </a:xfrm>
+          <a:prstGeom prst="rect">
+            <a:avLst/>
+          </a:prstGeom>
+          <a:noFill/>
+        </p:spPr>
+        <p:txBody>
+          <a:bodyPr wrap="square" rtlCol="0">
+            <a:spAutoFit/>
+          </a:bodyPr>
+          <a:lstStyle/>
+          <a:p>
+            <a:r>
+              <a:rPr lang="en-US" altLang="zh-CN" sz="1400" dirty="0"/>
+              <a:t>192.168.1.116:80</a:t>
+            </a:r>
+            <a:endParaRPr lang="zh-CN" altLang="en-US" sz="1400" dirty="0"/>
+          </a:p>
+        </p:txBody>
+      </p:sp>
+      <p:sp>
+        <p:nvSpPr>
+          <p:cNvPr id="79" name="文本框 78">
+            <a:extLst>
+              <a:ext uri="{FF2B5EF4-FFF2-40B4-BE49-F238E27FC236}">
+                <a16:creationId xmlns:a16="http://schemas.microsoft.com/office/drawing/2014/main" id="{0B43AD09-D2FA-46E4-863A-1477C12F325D}"/>
+              </a:ext>
+            </a:extLst>
+          </p:cNvPr>
+          <p:cNvSpPr txBox="1"/>
+          <p:nvPr/>
+        </p:nvSpPr>
+        <p:spPr>
+          <a:xfrm>
+            <a:off x="7787974" y="6606802"/>
+            <a:ext cx="1713125" cy="307777"/>
+          </a:xfrm>
+          <a:prstGeom prst="rect">
+            <a:avLst/>
+          </a:prstGeom>
+          <a:noFill/>
+        </p:spPr>
+        <p:txBody>
+          <a:bodyPr wrap="square" rtlCol="0">
+            <a:spAutoFit/>
+          </a:bodyPr>
+          <a:lstStyle/>
+          <a:p>
+            <a:r>
+              <a:rPr lang="en-US" altLang="zh-CN" sz="1400" dirty="0"/>
+              <a:t>192.168.1.118:80</a:t>
+            </a:r>
+            <a:endParaRPr lang="zh-CN" altLang="en-US" sz="1400" dirty="0"/>
+          </a:p>
+        </p:txBody>
+      </p:sp>
+      <p:sp>
+        <p:nvSpPr>
+          <p:cNvPr id="80" name="矩形: 圆角 79">
+            <a:extLst>
+              <a:ext uri="{FF2B5EF4-FFF2-40B4-BE49-F238E27FC236}">
+                <a16:creationId xmlns:a16="http://schemas.microsoft.com/office/drawing/2014/main" id="{D4B2FF12-8290-4F76-88D6-81F05817407E}"/>
+              </a:ext>
+            </a:extLst>
+          </p:cNvPr>
+          <p:cNvSpPr/>
+          <p:nvPr/>
+        </p:nvSpPr>
+        <p:spPr>
+          <a:xfrm>
+            <a:off x="10826964" y="5773861"/>
+            <a:ext cx="2825397" cy="1665881"/>
+          </a:xfrm>
+          <a:prstGeom prst="roundRect">
+            <a:avLst/>
+          </a:prstGeom>
+          <a:solidFill>
+            <a:schemeClr val="accent2">
+              <a:lumMod val="40000"/>
+              <a:lumOff val="60000"/>
+            </a:schemeClr>
+          </a:solidFill>
+        </p:spPr>
+        <p:style>
+          <a:lnRef idx="2">
+            <a:schemeClr val="accent1">
+              <a:shade val="50000"/>
+            </a:schemeClr>
+          </a:lnRef>
+          <a:fillRef idx="1">
+            <a:schemeClr val="accent1"/>
+          </a:fillRef>
+          <a:effectRef idx="0">
+            <a:schemeClr val="accent1"/>
+          </a:effectRef>
+          <a:fontRef idx="minor">
+            <a:schemeClr val="lt1"/>
+          </a:fontRef>
+        </p:style>
+        <p:txBody>
+          <a:bodyPr rtlCol="0" anchor="ctr"/>
+          <a:lstStyle/>
+          <a:p>
+            <a:pPr algn="ctr"/>
+            <a:endParaRPr lang="zh-CN" altLang="en-US" dirty="0"/>
+          </a:p>
+        </p:txBody>
+      </p:sp>
+      <p:sp>
+        <p:nvSpPr>
+          <p:cNvPr id="81" name="矩形: 圆角 80">
+            <a:extLst>
+              <a:ext uri="{FF2B5EF4-FFF2-40B4-BE49-F238E27FC236}">
+                <a16:creationId xmlns:a16="http://schemas.microsoft.com/office/drawing/2014/main" id="{DA7D7064-3F26-4926-94C0-C7DE30E4AA79}"/>
+              </a:ext>
+            </a:extLst>
+          </p:cNvPr>
+          <p:cNvSpPr/>
+          <p:nvPr/>
+        </p:nvSpPr>
+        <p:spPr>
+          <a:xfrm>
+            <a:off x="11106070" y="6223787"/>
+            <a:ext cx="2230754" cy="393932"/>
+          </a:xfrm>
+          <a:prstGeom prst="roundRect">
+            <a:avLst/>
+          </a:prstGeom>
+        </p:spPr>
+        <p:style>
+          <a:lnRef idx="2">
+            <a:schemeClr val="accent1">
+              <a:shade val="50000"/>
+            </a:schemeClr>
+          </a:lnRef>
+          <a:fillRef idx="1">
+            <a:schemeClr val="accent1"/>
+          </a:fillRef>
+          <a:effectRef idx="0">
+            <a:schemeClr val="accent1"/>
+          </a:effectRef>
+          <a:fontRef idx="minor">
+            <a:schemeClr val="lt1"/>
+          </a:fontRef>
+        </p:style>
+        <p:txBody>
+          <a:bodyPr rtlCol="0" anchor="ctr"/>
+          <a:lstStyle/>
+          <a:p>
+            <a:pPr algn="ctr"/>
+            <a:r>
+              <a:rPr lang="en-US" altLang="zh-CN" dirty="0"/>
+              <a:t>App04_vm01</a:t>
+            </a:r>
+            <a:endParaRPr lang="zh-CN" altLang="en-US" dirty="0"/>
+          </a:p>
+        </p:txBody>
+      </p:sp>
+      <p:sp>
+        <p:nvSpPr>
+          <p:cNvPr id="82" name="矩形: 圆角 81">
+            <a:extLst>
+              <a:ext uri="{FF2B5EF4-FFF2-40B4-BE49-F238E27FC236}">
+                <a16:creationId xmlns:a16="http://schemas.microsoft.com/office/drawing/2014/main" id="{5F868DFB-D26C-46CC-86A8-0CE3FB90DEF7}"/>
+              </a:ext>
+            </a:extLst>
+          </p:cNvPr>
+          <p:cNvSpPr/>
+          <p:nvPr/>
+        </p:nvSpPr>
+        <p:spPr>
+          <a:xfrm>
+            <a:off x="11101522" y="6957032"/>
+            <a:ext cx="2238121" cy="393932"/>
+          </a:xfrm>
+          <a:prstGeom prst="roundRect">
+            <a:avLst/>
+          </a:prstGeom>
+        </p:spPr>
+        <p:style>
+          <a:lnRef idx="2">
+            <a:schemeClr val="accent1">
+              <a:shade val="50000"/>
+            </a:schemeClr>
+          </a:lnRef>
+          <a:fillRef idx="1">
+            <a:schemeClr val="accent1"/>
+          </a:fillRef>
+          <a:effectRef idx="0">
+            <a:schemeClr val="accent1"/>
+          </a:effectRef>
+          <a:fontRef idx="minor">
+            <a:schemeClr val="lt1"/>
+          </a:fontRef>
+        </p:style>
+        <p:txBody>
+          <a:bodyPr rtlCol="0" anchor="ctr"/>
+          <a:lstStyle/>
+          <a:p>
+            <a:pPr algn="ctr"/>
+            <a:r>
+              <a:rPr lang="en-US" altLang="zh-CN" dirty="0"/>
+              <a:t>App04_vm01</a:t>
+            </a:r>
+            <a:endParaRPr lang="zh-CN" altLang="en-US" dirty="0"/>
+          </a:p>
+        </p:txBody>
+      </p:sp>
+      <p:sp>
+        <p:nvSpPr>
+          <p:cNvPr id="83" name="文本框 82">
+            <a:extLst>
+              <a:ext uri="{FF2B5EF4-FFF2-40B4-BE49-F238E27FC236}">
+                <a16:creationId xmlns:a16="http://schemas.microsoft.com/office/drawing/2014/main" id="{25A60B15-89B8-4452-9046-AF223CDB7073}"/>
+              </a:ext>
+            </a:extLst>
+          </p:cNvPr>
+          <p:cNvSpPr txBox="1"/>
+          <p:nvPr/>
+        </p:nvSpPr>
+        <p:spPr>
+          <a:xfrm>
+            <a:off x="11388266" y="5884092"/>
+            <a:ext cx="1713125" cy="307777"/>
+          </a:xfrm>
+          <a:prstGeom prst="rect">
+            <a:avLst/>
+          </a:prstGeom>
+          <a:noFill/>
+        </p:spPr>
+        <p:txBody>
+          <a:bodyPr wrap="square" rtlCol="0">
+            <a:spAutoFit/>
+          </a:bodyPr>
+          <a:lstStyle/>
+          <a:p>
+            <a:r>
+              <a:rPr lang="en-US" altLang="zh-CN" sz="1400" dirty="0"/>
+              <a:t>192.168.1.117:80</a:t>
+            </a:r>
+            <a:endParaRPr lang="zh-CN" altLang="en-US" sz="1400" dirty="0"/>
+          </a:p>
+        </p:txBody>
+      </p:sp>
+      <p:sp>
+        <p:nvSpPr>
+          <p:cNvPr id="85" name="文本框 84">
+            <a:extLst>
+              <a:ext uri="{FF2B5EF4-FFF2-40B4-BE49-F238E27FC236}">
+                <a16:creationId xmlns:a16="http://schemas.microsoft.com/office/drawing/2014/main" id="{29275B35-A6CB-4CC7-B319-4015D6F3905E}"/>
+              </a:ext>
+            </a:extLst>
+          </p:cNvPr>
+          <p:cNvSpPr txBox="1"/>
+          <p:nvPr/>
+        </p:nvSpPr>
+        <p:spPr>
+          <a:xfrm>
+            <a:off x="11383101" y="6606802"/>
+            <a:ext cx="1713125" cy="307777"/>
+          </a:xfrm>
+          <a:prstGeom prst="rect">
+            <a:avLst/>
+          </a:prstGeom>
+          <a:noFill/>
+        </p:spPr>
+        <p:txBody>
+          <a:bodyPr wrap="square" rtlCol="0">
+            <a:spAutoFit/>
+          </a:bodyPr>
+          <a:lstStyle/>
+          <a:p>
+            <a:r>
+              <a:rPr lang="en-US" altLang="zh-CN" sz="1400" dirty="0"/>
+              <a:t>192.168.1.119:80</a:t>
+            </a:r>
+            <a:endParaRPr lang="zh-CN" altLang="en-US" sz="1400" dirty="0"/>
+          </a:p>
+        </p:txBody>
+      </p:sp>
+      <p:cxnSp>
+        <p:nvCxnSpPr>
+          <p:cNvPr id="87" name="直接箭头连接符 86">
+            <a:extLst>
+              <a:ext uri="{FF2B5EF4-FFF2-40B4-BE49-F238E27FC236}">
+                <a16:creationId xmlns:a16="http://schemas.microsoft.com/office/drawing/2014/main" id="{F5ABE8EE-9C40-4FD9-9FBB-EF587A4CE253}"/>
+              </a:ext>
+            </a:extLst>
+          </p:cNvPr>
+          <p:cNvCxnSpPr>
+            <a:stCxn id="55" idx="2"/>
+            <a:endCxn id="80" idx="0"/>
+          </p:cNvCxnSpPr>
+          <p:nvPr/>
+        </p:nvCxnSpPr>
+        <p:spPr>
+          <a:xfrm>
+            <a:off x="10479109" y="5287903"/>
+            <a:ext cx="1760552" cy="485958"/>
+          </a:xfrm>
+          <a:prstGeom prst="straightConnector1">
+            <a:avLst/>
+          </a:prstGeom>
+          <a:ln>
+            <a:tailEnd type="triangle"/>
+          </a:ln>
+        </p:spPr>
+        <p:style>
+          <a:lnRef idx="1">
+            <a:schemeClr val="accent1"/>
+          </a:lnRef>
+          <a:fillRef idx="0">
+            <a:schemeClr val="accent1"/>
+          </a:fillRef>
+          <a:effectRef idx="0">
+            <a:schemeClr val="accent1"/>
+          </a:effectRef>
+          <a:fontRef idx="minor">
+            <a:schemeClr val="tx1"/>
+          </a:fontRef>
+        </p:style>
+      </p:cxnSp>
+      <p:sp>
+        <p:nvSpPr>
+          <p:cNvPr id="88" name="文本框 87">
+            <a:extLst>
+              <a:ext uri="{FF2B5EF4-FFF2-40B4-BE49-F238E27FC236}">
+                <a16:creationId xmlns:a16="http://schemas.microsoft.com/office/drawing/2014/main" id="{7E28F4FA-015C-40F1-92C1-3D509C37ED71}"/>
+              </a:ext>
+            </a:extLst>
+          </p:cNvPr>
+          <p:cNvSpPr txBox="1"/>
+          <p:nvPr/>
+        </p:nvSpPr>
+        <p:spPr>
+          <a:xfrm>
+            <a:off x="10825846" y="5423628"/>
+            <a:ext cx="621660" cy="307777"/>
+          </a:xfrm>
+          <a:prstGeom prst="rect">
+            <a:avLst/>
+          </a:prstGeom>
+          <a:noFill/>
+        </p:spPr>
+        <p:txBody>
+          <a:bodyPr wrap="square" rtlCol="0">
+            <a:spAutoFit/>
+          </a:bodyPr>
+          <a:lstStyle/>
+          <a:p>
+            <a:r>
+              <a:rPr lang="en-US" altLang="zh-CN" sz="1400" dirty="0"/>
+              <a:t>8082</a:t>
+            </a:r>
+            <a:endParaRPr lang="zh-CN" altLang="en-US" sz="1400" dirty="0"/>
+          </a:p>
+        </p:txBody>
+      </p:sp>
+      <p:sp>
+        <p:nvSpPr>
+          <p:cNvPr id="89" name="矩形: 圆角 88">
+            <a:extLst>
+              <a:ext uri="{FF2B5EF4-FFF2-40B4-BE49-F238E27FC236}">
+                <a16:creationId xmlns:a16="http://schemas.microsoft.com/office/drawing/2014/main" id="{CBCF084A-BC4E-4E46-85F2-55A5A1FEC498}"/>
+              </a:ext>
+            </a:extLst>
+          </p:cNvPr>
+          <p:cNvSpPr/>
+          <p:nvPr/>
+        </p:nvSpPr>
+        <p:spPr>
+          <a:xfrm>
+            <a:off x="5511549" y="3225966"/>
+            <a:ext cx="3054591" cy="406440"/>
+          </a:xfrm>
+          <a:prstGeom prst="roundRect">
+            <a:avLst/>
+          </a:prstGeom>
+        </p:spPr>
+        <p:style>
+          <a:lnRef idx="2">
+            <a:schemeClr val="accent1">
+              <a:shade val="50000"/>
+            </a:schemeClr>
+          </a:lnRef>
+          <a:fillRef idx="1">
+            <a:schemeClr val="accent1"/>
+          </a:fillRef>
+          <a:effectRef idx="0">
+            <a:schemeClr val="accent1"/>
+          </a:effectRef>
+          <a:fontRef idx="minor">
+            <a:schemeClr val="lt1"/>
+          </a:fontRef>
+        </p:style>
+        <p:txBody>
+          <a:bodyPr rtlCol="0" anchor="ctr"/>
+          <a:lstStyle/>
+          <a:p>
+            <a:pPr algn="ctr"/>
+            <a:r>
+              <a:rPr lang="en-US" altLang="zh-CN" dirty="0"/>
+              <a:t>Nginx_vm02</a:t>
+            </a:r>
+            <a:r>
+              <a:rPr lang="zh-CN" altLang="en-US" dirty="0"/>
+              <a:t> （</a:t>
+            </a:r>
+            <a:r>
+              <a:rPr lang="en-US" altLang="zh-CN" dirty="0"/>
+              <a:t>192.168.1.123</a:t>
+            </a:r>
+            <a:r>
+              <a:rPr lang="zh-CN" altLang="en-US" dirty="0"/>
+              <a:t>）</a:t>
+            </a:r>
+            <a:endParaRPr lang="en-US" altLang="zh-CN" dirty="0"/>
+          </a:p>
+        </p:txBody>
+      </p:sp>
+      <p:sp>
+        <p:nvSpPr>
+          <p:cNvPr id="90" name="矩形: 圆角 89">
+            <a:extLst>
+              <a:ext uri="{FF2B5EF4-FFF2-40B4-BE49-F238E27FC236}">
+                <a16:creationId xmlns:a16="http://schemas.microsoft.com/office/drawing/2014/main" id="{0DF108F0-58DF-4AA5-A864-F749D4F45F3B}"/>
+              </a:ext>
+            </a:extLst>
+          </p:cNvPr>
+          <p:cNvSpPr/>
+          <p:nvPr/>
+        </p:nvSpPr>
+        <p:spPr>
+          <a:xfrm>
+            <a:off x="1102886" y="3225966"/>
+            <a:ext cx="3054591" cy="406440"/>
+          </a:xfrm>
+          <a:prstGeom prst="roundRect">
+            <a:avLst/>
+          </a:prstGeom>
+        </p:spPr>
+        <p:style>
+          <a:lnRef idx="2">
+            <a:schemeClr val="accent1">
+              <a:shade val="50000"/>
+            </a:schemeClr>
+          </a:lnRef>
+          <a:fillRef idx="1">
+            <a:schemeClr val="accent1"/>
+          </a:fillRef>
+          <a:effectRef idx="0">
+            <a:schemeClr val="accent1"/>
+          </a:effectRef>
+          <a:fontRef idx="minor">
+            <a:schemeClr val="lt1"/>
+          </a:fontRef>
+        </p:style>
+        <p:txBody>
+          <a:bodyPr rtlCol="0" anchor="ctr"/>
+          <a:lstStyle/>
+          <a:p>
+            <a:pPr algn="ctr"/>
+            <a:r>
+              <a:rPr lang="en-US" altLang="zh-CN" dirty="0"/>
+              <a:t>Nginx_vm01</a:t>
+            </a:r>
+            <a:r>
+              <a:rPr lang="zh-CN" altLang="en-US" dirty="0"/>
+              <a:t>（</a:t>
+            </a:r>
+            <a:r>
+              <a:rPr lang="en-US" altLang="zh-CN" dirty="0"/>
+              <a:t>192.168.1.122</a:t>
+            </a:r>
+            <a:r>
+              <a:rPr lang="zh-CN" altLang="en-US" dirty="0"/>
+              <a:t>）</a:t>
+            </a:r>
+            <a:endParaRPr lang="en-US" altLang="zh-CN" dirty="0"/>
+          </a:p>
+        </p:txBody>
+      </p:sp>
+      <p:sp>
+        <p:nvSpPr>
+          <p:cNvPr id="93" name="矩形: 圆角 92">
+            <a:extLst>
+              <a:ext uri="{FF2B5EF4-FFF2-40B4-BE49-F238E27FC236}">
+                <a16:creationId xmlns:a16="http://schemas.microsoft.com/office/drawing/2014/main" id="{68B18F19-30B5-48DF-B3AE-E60E52F62BE7}"/>
+              </a:ext>
+            </a:extLst>
+          </p:cNvPr>
+          <p:cNvSpPr/>
+          <p:nvPr/>
+        </p:nvSpPr>
+        <p:spPr>
+          <a:xfrm>
+            <a:off x="9920211" y="3211104"/>
+            <a:ext cx="3054591" cy="406440"/>
+          </a:xfrm>
+          <a:prstGeom prst="roundRect">
+            <a:avLst/>
+          </a:prstGeom>
+        </p:spPr>
+        <p:style>
+          <a:lnRef idx="2">
+            <a:schemeClr val="accent1">
+              <a:shade val="50000"/>
+            </a:schemeClr>
+          </a:lnRef>
+          <a:fillRef idx="1">
+            <a:schemeClr val="accent1"/>
+          </a:fillRef>
+          <a:effectRef idx="0">
+            <a:schemeClr val="accent1"/>
+          </a:effectRef>
+          <a:fontRef idx="minor">
+            <a:schemeClr val="lt1"/>
+          </a:fontRef>
+        </p:style>
+        <p:txBody>
+          <a:bodyPr rtlCol="0" anchor="ctr"/>
+          <a:lstStyle/>
+          <a:p>
+            <a:pPr algn="ctr"/>
+            <a:r>
+              <a:rPr lang="en-US" altLang="zh-CN" dirty="0"/>
+              <a:t>Nginx_vm03</a:t>
+            </a:r>
+            <a:r>
+              <a:rPr lang="zh-CN" altLang="en-US" dirty="0"/>
+              <a:t> （</a:t>
+            </a:r>
+            <a:r>
+              <a:rPr lang="en-US" altLang="zh-CN" dirty="0"/>
+              <a:t>192.168.1.123</a:t>
+            </a:r>
+            <a:r>
+              <a:rPr lang="zh-CN" altLang="en-US" dirty="0"/>
+              <a:t>）</a:t>
+            </a:r>
+            <a:endParaRPr lang="en-US" altLang="zh-CN" dirty="0"/>
+          </a:p>
+        </p:txBody>
+      </p:sp>
+      <p:sp>
+        <p:nvSpPr>
+          <p:cNvPr id="94" name="矩形: 圆角 93">
+            <a:extLst>
+              <a:ext uri="{FF2B5EF4-FFF2-40B4-BE49-F238E27FC236}">
+                <a16:creationId xmlns:a16="http://schemas.microsoft.com/office/drawing/2014/main" id="{8870D832-076A-44EF-BCE0-115DA4C08945}"/>
+              </a:ext>
+            </a:extLst>
+          </p:cNvPr>
+          <p:cNvSpPr/>
+          <p:nvPr/>
+        </p:nvSpPr>
+        <p:spPr>
+          <a:xfrm>
+            <a:off x="408475" y="2278072"/>
+            <a:ext cx="13317905" cy="406440"/>
+          </a:xfrm>
+          <a:prstGeom prst="roundRect">
+            <a:avLst/>
+          </a:prstGeom>
+          <a:solidFill>
+            <a:schemeClr val="accent2">
+              <a:lumMod val="60000"/>
+              <a:lumOff val="40000"/>
+            </a:schemeClr>
+          </a:solidFill>
+        </p:spPr>
+        <p:style>
+          <a:lnRef idx="2">
+            <a:schemeClr val="accent1">
+              <a:shade val="50000"/>
+            </a:schemeClr>
+          </a:lnRef>
+          <a:fillRef idx="1">
+            <a:schemeClr val="accent1"/>
+          </a:fillRef>
+          <a:effectRef idx="0">
+            <a:schemeClr val="accent1"/>
+          </a:effectRef>
+          <a:fontRef idx="minor">
+            <a:schemeClr val="lt1"/>
+          </a:fontRef>
+        </p:style>
+        <p:txBody>
+          <a:bodyPr rtlCol="0" anchor="ctr"/>
+          <a:lstStyle/>
+          <a:p>
+            <a:pPr algn="ctr"/>
+            <a:r>
+              <a:rPr lang="en-US" altLang="zh-CN" dirty="0"/>
+              <a:t>ELB</a:t>
+            </a:r>
+            <a:r>
+              <a:rPr lang="zh-CN" altLang="en-US" dirty="0"/>
+              <a:t>（公网</a:t>
+            </a:r>
+            <a:r>
+              <a:rPr lang="en-US" altLang="zh-CN" dirty="0"/>
+              <a:t>IP</a:t>
+            </a:r>
+            <a:r>
+              <a:rPr lang="zh-CN" altLang="en-US" dirty="0"/>
+              <a:t>）</a:t>
+            </a:r>
+            <a:endParaRPr lang="en-US" altLang="zh-CN" dirty="0"/>
+          </a:p>
+        </p:txBody>
+      </p:sp>
+      <p:cxnSp>
+        <p:nvCxnSpPr>
+          <p:cNvPr id="16" name="直接箭头连接符 15">
+            <a:extLst>
+              <a:ext uri="{FF2B5EF4-FFF2-40B4-BE49-F238E27FC236}">
+                <a16:creationId xmlns:a16="http://schemas.microsoft.com/office/drawing/2014/main" id="{59DAB4AB-C094-4589-9775-1C8ABD4C95C2}"/>
+              </a:ext>
+            </a:extLst>
+          </p:cNvPr>
+          <p:cNvCxnSpPr>
+            <a:cxnSpLocks/>
+            <a:stCxn id="69" idx="2"/>
+            <a:endCxn id="94" idx="0"/>
+          </p:cNvCxnSpPr>
+          <p:nvPr/>
+        </p:nvCxnSpPr>
+        <p:spPr>
+          <a:xfrm flipH="1">
+            <a:off x="7067428" y="1789500"/>
+            <a:ext cx="1" cy="488572"/>
+          </a:xfrm>
+          <a:prstGeom prst="straightConnector1">
+            <a:avLst/>
+          </a:prstGeom>
+          <a:ln>
+            <a:tailEnd type="triangle"/>
+          </a:ln>
+        </p:spPr>
+        <p:style>
+          <a:lnRef idx="1">
+            <a:schemeClr val="accent1"/>
+          </a:lnRef>
+          <a:fillRef idx="0">
+            <a:schemeClr val="accent1"/>
+          </a:fillRef>
+          <a:effectRef idx="0">
+            <a:schemeClr val="accent1"/>
+          </a:effectRef>
+          <a:fontRef idx="minor">
+            <a:schemeClr val="tx1"/>
+          </a:fontRef>
+        </p:style>
+      </p:cxnSp>
+      <p:cxnSp>
+        <p:nvCxnSpPr>
+          <p:cNvPr id="3" name="直接箭头连接符 2">
+            <a:extLst>
+              <a:ext uri="{FF2B5EF4-FFF2-40B4-BE49-F238E27FC236}">
+                <a16:creationId xmlns:a16="http://schemas.microsoft.com/office/drawing/2014/main" id="{57ED4497-4E96-40EB-BBF2-C06351C0402D}"/>
+              </a:ext>
+            </a:extLst>
+          </p:cNvPr>
+          <p:cNvCxnSpPr>
+            <a:stCxn id="94" idx="2"/>
+            <a:endCxn id="108" idx="0"/>
+          </p:cNvCxnSpPr>
+          <p:nvPr/>
+        </p:nvCxnSpPr>
+        <p:spPr>
+          <a:xfrm>
+            <a:off x="7067427" y="2684512"/>
+            <a:ext cx="0" cy="261124"/>
+          </a:xfrm>
+          <a:prstGeom prst="straightConnector1">
+            <a:avLst/>
+          </a:prstGeom>
+          <a:ln>
+            <a:tailEnd type="triangle"/>
+          </a:ln>
+        </p:spPr>
+        <p:style>
+          <a:lnRef idx="1">
+            <a:schemeClr val="accent1"/>
+          </a:lnRef>
+          <a:fillRef idx="0">
+            <a:schemeClr val="accent1"/>
+          </a:fillRef>
+          <a:effectRef idx="0">
+            <a:schemeClr val="accent1"/>
+          </a:effectRef>
+          <a:fontRef idx="minor">
+            <a:schemeClr val="tx1"/>
+          </a:fontRef>
+        </p:style>
+      </p:cxnSp>
+      <p:cxnSp>
+        <p:nvCxnSpPr>
+          <p:cNvPr id="5" name="直接箭头连接符 4">
+            <a:extLst>
+              <a:ext uri="{FF2B5EF4-FFF2-40B4-BE49-F238E27FC236}">
+                <a16:creationId xmlns:a16="http://schemas.microsoft.com/office/drawing/2014/main" id="{2C3B1CA8-8776-4C18-8EE9-CD2AEC5435BB}"/>
+              </a:ext>
+            </a:extLst>
+          </p:cNvPr>
+          <p:cNvCxnSpPr>
+            <a:stCxn id="108" idx="2"/>
+            <a:endCxn id="64" idx="0"/>
+          </p:cNvCxnSpPr>
+          <p:nvPr/>
+        </p:nvCxnSpPr>
+        <p:spPr>
+          <a:xfrm flipH="1">
+            <a:off x="3655749" y="3886267"/>
+            <a:ext cx="3411678" cy="458110"/>
+          </a:xfrm>
+          <a:prstGeom prst="straightConnector1">
+            <a:avLst/>
+          </a:prstGeom>
+          <a:ln>
+            <a:tailEnd type="triangle"/>
+          </a:ln>
+        </p:spPr>
+        <p:style>
+          <a:lnRef idx="1">
+            <a:schemeClr val="accent1"/>
+          </a:lnRef>
+          <a:fillRef idx="0">
+            <a:schemeClr val="accent1"/>
+          </a:fillRef>
+          <a:effectRef idx="0">
+            <a:schemeClr val="accent1"/>
+          </a:effectRef>
+          <a:fontRef idx="minor">
+            <a:schemeClr val="tx1"/>
+          </a:fontRef>
+        </p:style>
+      </p:cxnSp>
+      <p:cxnSp>
+        <p:nvCxnSpPr>
+          <p:cNvPr id="7" name="直接箭头连接符 6">
+            <a:extLst>
+              <a:ext uri="{FF2B5EF4-FFF2-40B4-BE49-F238E27FC236}">
+                <a16:creationId xmlns:a16="http://schemas.microsoft.com/office/drawing/2014/main" id="{FD5BE749-3E82-4C38-AABC-C2BFCE859C76}"/>
+              </a:ext>
+            </a:extLst>
+          </p:cNvPr>
+          <p:cNvCxnSpPr>
+            <a:stCxn id="108" idx="2"/>
+            <a:endCxn id="55" idx="0"/>
+          </p:cNvCxnSpPr>
+          <p:nvPr/>
+        </p:nvCxnSpPr>
+        <p:spPr>
+          <a:xfrm>
+            <a:off x="7067427" y="3886267"/>
+            <a:ext cx="3411680" cy="461004"/>
+          </a:xfrm>
+          <a:prstGeom prst="straightConnector1">
+            <a:avLst/>
+          </a:prstGeom>
+          <a:ln>
+            <a:tailEnd type="triangle"/>
+          </a:ln>
+        </p:spPr>
+        <p:style>
+          <a:lnRef idx="1">
+            <a:schemeClr val="accent1"/>
+          </a:lnRef>
+          <a:fillRef idx="0">
+            <a:schemeClr val="accent1"/>
+          </a:fillRef>
+          <a:effectRef idx="0">
+            <a:schemeClr val="accent1"/>
+          </a:effectRef>
+          <a:fontRef idx="minor">
+            <a:schemeClr val="tx1"/>
+          </a:fontRef>
+        </p:style>
+      </p:cxnSp>
+      <p:sp>
+        <p:nvSpPr>
+          <p:cNvPr id="70" name="矩形: 圆角 69">
+            <a:extLst>
+              <a:ext uri="{FF2B5EF4-FFF2-40B4-BE49-F238E27FC236}">
+                <a16:creationId xmlns:a16="http://schemas.microsoft.com/office/drawing/2014/main" id="{EB100F23-57D8-439A-9308-06AF3EF6887D}"/>
+              </a:ext>
+            </a:extLst>
+          </p:cNvPr>
+          <p:cNvSpPr/>
+          <p:nvPr/>
+        </p:nvSpPr>
+        <p:spPr>
+          <a:xfrm>
+            <a:off x="408475" y="7928097"/>
+            <a:ext cx="13243886" cy="745620"/>
+          </a:xfrm>
+          <a:prstGeom prst="roundRect">
+            <a:avLst/>
+          </a:prstGeom>
+          <a:solidFill>
+            <a:schemeClr val="accent2">
+              <a:lumMod val="20000"/>
+              <a:lumOff val="80000"/>
+            </a:schemeClr>
+          </a:solidFill>
+        </p:spPr>
+        <p:style>
+          <a:lnRef idx="2">
+            <a:schemeClr val="accent1">
+              <a:shade val="50000"/>
+            </a:schemeClr>
+          </a:lnRef>
+          <a:fillRef idx="1">
+            <a:schemeClr val="accent1"/>
+          </a:fillRef>
+          <a:effectRef idx="0">
+            <a:schemeClr val="accent1"/>
+          </a:effectRef>
+          <a:fontRef idx="minor">
+            <a:schemeClr val="lt1"/>
+          </a:fontRef>
+        </p:style>
+        <p:txBody>
+          <a:bodyPr rtlCol="0" anchor="ctr"/>
+          <a:lstStyle/>
+          <a:p>
+            <a:pPr algn="ctr"/>
+            <a:endParaRPr lang="zh-CN" altLang="en-US"/>
+          </a:p>
+        </p:txBody>
+      </p:sp>
+      <p:sp>
+        <p:nvSpPr>
+          <p:cNvPr id="91" name="矩形: 圆角 90">
+            <a:extLst>
+              <a:ext uri="{FF2B5EF4-FFF2-40B4-BE49-F238E27FC236}">
+                <a16:creationId xmlns:a16="http://schemas.microsoft.com/office/drawing/2014/main" id="{BA148A32-3CCB-489A-8EE5-64C20F63CF60}"/>
+              </a:ext>
+            </a:extLst>
+          </p:cNvPr>
+          <p:cNvSpPr/>
+          <p:nvPr/>
+        </p:nvSpPr>
+        <p:spPr>
+          <a:xfrm>
+            <a:off x="683037" y="8117553"/>
+            <a:ext cx="6145966" cy="393932"/>
+          </a:xfrm>
+          <a:prstGeom prst="roundRect">
+            <a:avLst/>
+          </a:prstGeom>
+        </p:spPr>
+        <p:style>
+          <a:lnRef idx="2">
+            <a:schemeClr val="accent1">
+              <a:shade val="50000"/>
+            </a:schemeClr>
+          </a:lnRef>
+          <a:fillRef idx="1">
+            <a:schemeClr val="accent1"/>
+          </a:fillRef>
+          <a:effectRef idx="0">
+            <a:schemeClr val="accent1"/>
+          </a:effectRef>
+          <a:fontRef idx="minor">
+            <a:schemeClr val="lt1"/>
+          </a:fontRef>
+        </p:style>
+        <p:txBody>
+          <a:bodyPr rtlCol="0" anchor="ctr"/>
+          <a:lstStyle/>
+          <a:p>
+            <a:pPr algn="ctr"/>
+            <a:r>
+              <a:rPr lang="en-US" altLang="zh-CN" dirty="0"/>
+              <a:t>KeepAlived + </a:t>
+            </a:r>
+            <a:r>
+              <a:rPr lang="en-US" altLang="zh-CN" dirty="0" err="1"/>
+              <a:t>MySql</a:t>
+            </a:r>
+            <a:r>
+              <a:rPr lang="zh-CN" altLang="en-US" dirty="0"/>
+              <a:t>（</a:t>
+            </a:r>
+            <a:r>
+              <a:rPr lang="en-US" altLang="zh-CN" dirty="0"/>
+              <a:t>192.168.1.132</a:t>
+            </a:r>
+            <a:r>
+              <a:rPr lang="zh-CN" altLang="en-US" dirty="0"/>
+              <a:t>）</a:t>
+            </a:r>
+          </a:p>
+        </p:txBody>
+      </p:sp>
+      <p:sp>
+        <p:nvSpPr>
+          <p:cNvPr id="92" name="矩形: 圆角 91">
+            <a:extLst>
+              <a:ext uri="{FF2B5EF4-FFF2-40B4-BE49-F238E27FC236}">
+                <a16:creationId xmlns:a16="http://schemas.microsoft.com/office/drawing/2014/main" id="{D2EF126C-849F-4709-83DB-8E2AB0CCF587}"/>
+              </a:ext>
+            </a:extLst>
+          </p:cNvPr>
+          <p:cNvSpPr/>
+          <p:nvPr/>
+        </p:nvSpPr>
+        <p:spPr>
+          <a:xfrm>
+            <a:off x="7231833" y="8153409"/>
+            <a:ext cx="6098979" cy="393932"/>
+          </a:xfrm>
+          <a:prstGeom prst="roundRect">
+            <a:avLst/>
+          </a:prstGeom>
+        </p:spPr>
+        <p:style>
+          <a:lnRef idx="2">
+            <a:schemeClr val="accent1">
+              <a:shade val="50000"/>
+            </a:schemeClr>
+          </a:lnRef>
+          <a:fillRef idx="1">
+            <a:schemeClr val="accent1"/>
+          </a:fillRef>
+          <a:effectRef idx="0">
+            <a:schemeClr val="accent1"/>
+          </a:effectRef>
+          <a:fontRef idx="minor">
+            <a:schemeClr val="lt1"/>
+          </a:fontRef>
+        </p:style>
+        <p:txBody>
+          <a:bodyPr rtlCol="0" anchor="ctr"/>
+          <a:lstStyle/>
+          <a:p>
+            <a:pPr algn="ctr"/>
+            <a:r>
+              <a:rPr lang="en-US" altLang="zh-CN" dirty="0"/>
+              <a:t>HAProxy + </a:t>
+            </a:r>
+            <a:r>
+              <a:rPr lang="en-US" altLang="zh-CN" dirty="0" err="1"/>
+              <a:t>MySql</a:t>
+            </a:r>
+            <a:r>
+              <a:rPr lang="zh-CN" altLang="en-US" dirty="0"/>
+              <a:t> （</a:t>
+            </a:r>
+            <a:r>
+              <a:rPr lang="en-US" altLang="zh-CN" dirty="0"/>
+              <a:t>192.168.1.133</a:t>
+            </a:r>
+            <a:r>
+              <a:rPr lang="zh-CN" altLang="en-US" dirty="0"/>
+              <a:t>）</a:t>
+            </a:r>
+          </a:p>
+        </p:txBody>
+      </p:sp>
+      <p:sp>
+        <p:nvSpPr>
+          <p:cNvPr id="95" name="文本框 94">
+            <a:extLst>
+              <a:ext uri="{FF2B5EF4-FFF2-40B4-BE49-F238E27FC236}">
+                <a16:creationId xmlns:a16="http://schemas.microsoft.com/office/drawing/2014/main" id="{DB3B4904-5D5E-4BEE-8041-DA6F1A326A25}"/>
+              </a:ext>
+            </a:extLst>
+          </p:cNvPr>
+          <p:cNvSpPr txBox="1"/>
+          <p:nvPr/>
+        </p:nvSpPr>
+        <p:spPr>
+          <a:xfrm>
+            <a:off x="7190969" y="7535892"/>
+            <a:ext cx="1868837" cy="307777"/>
+          </a:xfrm>
+          <a:prstGeom prst="rect">
+            <a:avLst/>
+          </a:prstGeom>
+          <a:noFill/>
+        </p:spPr>
+        <p:txBody>
+          <a:bodyPr wrap="square" rtlCol="0">
+            <a:spAutoFit/>
+          </a:bodyPr>
+          <a:lstStyle/>
+          <a:p>
+            <a:r>
+              <a:rPr lang="en-US" altLang="zh-CN" sz="1400" b="1" dirty="0">
+                <a:solidFill>
+                  <a:srgbClr val="FF0000"/>
+                </a:solidFill>
+              </a:rPr>
+              <a:t>VIP</a:t>
+            </a:r>
+            <a:r>
+              <a:rPr lang="en-US" altLang="zh-CN" sz="1400" dirty="0">
+                <a:solidFill>
+                  <a:srgbClr val="FF0000"/>
+                </a:solidFill>
+              </a:rPr>
+              <a:t>: 192.168.1.134</a:t>
+            </a:r>
+            <a:endParaRPr lang="zh-CN" altLang="en-US" sz="1400" dirty="0">
+              <a:solidFill>
+                <a:srgbClr val="FF0000"/>
+              </a:solidFill>
+            </a:endParaRPr>
+          </a:p>
+        </p:txBody>
+      </p:sp>
       <p:cxnSp>
         <p:nvCxnSpPr>
           <p:cNvPr id="97" name="直接箭头连接符 96">
@@ -9387,8 +11880,8 @@
         </p:nvCxnSpPr>
         <p:spPr>
           <a:xfrm flipH="1">
-            <a:off x="3756020" y="7928096"/>
-            <a:ext cx="3274398" cy="396721"/>
+            <a:off x="3756020" y="7928097"/>
+            <a:ext cx="3274398" cy="189456"/>
           </a:xfrm>
           <a:prstGeom prst="straightConnector1">
             <a:avLst/>
@@ -9430,8 +11923,8 @@
         </p:nvCxnSpPr>
         <p:spPr>
           <a:xfrm>
-            <a:off x="7030418" y="7928096"/>
-            <a:ext cx="3250905" cy="432577"/>
+            <a:off x="7030418" y="7928097"/>
+            <a:ext cx="3250905" cy="225312"/>
           </a:xfrm>
           <a:prstGeom prst="straightConnector1">
             <a:avLst/>
@@ -9473,7 +11966,7 @@
         <p:spPr>
           <a:xfrm>
             <a:off x="7030418" y="7535892"/>
-            <a:ext cx="0" cy="392204"/>
+            <a:ext cx="0" cy="392205"/>
           </a:xfrm>
           <a:prstGeom prst="straightConnector1">
             <a:avLst/>

</xml_diff>

<commit_message>
Site updated: 2018-10-05 23:18:30
</commit_message>
<xml_diff>
--- a/posts/我的博客规划路线图/规划图.pptx
+++ b/posts/我的博客规划路线图/规划图.pptx
@@ -8,8 +8,9 @@
     <p:sldId id="256" r:id="rId2"/>
     <p:sldId id="257" r:id="rId3"/>
     <p:sldId id="258" r:id="rId4"/>
-    <p:sldId id="260" r:id="rId5"/>
-    <p:sldId id="259" r:id="rId6"/>
+    <p:sldId id="261" r:id="rId5"/>
+    <p:sldId id="260" r:id="rId6"/>
+    <p:sldId id="259" r:id="rId7"/>
   </p:sldIdLst>
   <p:sldSz cx="14400213" cy="8999538"/>
   <p:notesSz cx="6858000" cy="9144000"/>
@@ -247,7 +248,7 @@
           <a:p>
             <a:fld id="{27F5F0DE-742F-4352-B2C3-191EDE9D6ED5}" type="datetimeFigureOut">
               <a:rPr lang="zh-CN" altLang="en-US" smtClean="0"/>
-              <a:t>2018/10/2</a:t>
+              <a:t>2018/10/5</a:t>
             </a:fld>
             <a:endParaRPr lang="zh-CN" altLang="en-US"/>
           </a:p>
@@ -417,7 +418,7 @@
           <a:p>
             <a:fld id="{27F5F0DE-742F-4352-B2C3-191EDE9D6ED5}" type="datetimeFigureOut">
               <a:rPr lang="zh-CN" altLang="en-US" smtClean="0"/>
-              <a:t>2018/10/2</a:t>
+              <a:t>2018/10/5</a:t>
             </a:fld>
             <a:endParaRPr lang="zh-CN" altLang="en-US"/>
           </a:p>
@@ -597,7 +598,7 @@
           <a:p>
             <a:fld id="{27F5F0DE-742F-4352-B2C3-191EDE9D6ED5}" type="datetimeFigureOut">
               <a:rPr lang="zh-CN" altLang="en-US" smtClean="0"/>
-              <a:t>2018/10/2</a:t>
+              <a:t>2018/10/5</a:t>
             </a:fld>
             <a:endParaRPr lang="zh-CN" altLang="en-US"/>
           </a:p>
@@ -767,7 +768,7 @@
           <a:p>
             <a:fld id="{27F5F0DE-742F-4352-B2C3-191EDE9D6ED5}" type="datetimeFigureOut">
               <a:rPr lang="zh-CN" altLang="en-US" smtClean="0"/>
-              <a:t>2018/10/2</a:t>
+              <a:t>2018/10/5</a:t>
             </a:fld>
             <a:endParaRPr lang="zh-CN" altLang="en-US"/>
           </a:p>
@@ -1013,7 +1014,7 @@
           <a:p>
             <a:fld id="{27F5F0DE-742F-4352-B2C3-191EDE9D6ED5}" type="datetimeFigureOut">
               <a:rPr lang="zh-CN" altLang="en-US" smtClean="0"/>
-              <a:t>2018/10/2</a:t>
+              <a:t>2018/10/5</a:t>
             </a:fld>
             <a:endParaRPr lang="zh-CN" altLang="en-US"/>
           </a:p>
@@ -1245,7 +1246,7 @@
           <a:p>
             <a:fld id="{27F5F0DE-742F-4352-B2C3-191EDE9D6ED5}" type="datetimeFigureOut">
               <a:rPr lang="zh-CN" altLang="en-US" smtClean="0"/>
-              <a:t>2018/10/2</a:t>
+              <a:t>2018/10/5</a:t>
             </a:fld>
             <a:endParaRPr lang="zh-CN" altLang="en-US"/>
           </a:p>
@@ -1612,7 +1613,7 @@
           <a:p>
             <a:fld id="{27F5F0DE-742F-4352-B2C3-191EDE9D6ED5}" type="datetimeFigureOut">
               <a:rPr lang="zh-CN" altLang="en-US" smtClean="0"/>
-              <a:t>2018/10/2</a:t>
+              <a:t>2018/10/5</a:t>
             </a:fld>
             <a:endParaRPr lang="zh-CN" altLang="en-US"/>
           </a:p>
@@ -1730,7 +1731,7 @@
           <a:p>
             <a:fld id="{27F5F0DE-742F-4352-B2C3-191EDE9D6ED5}" type="datetimeFigureOut">
               <a:rPr lang="zh-CN" altLang="en-US" smtClean="0"/>
-              <a:t>2018/10/2</a:t>
+              <a:t>2018/10/5</a:t>
             </a:fld>
             <a:endParaRPr lang="zh-CN" altLang="en-US"/>
           </a:p>
@@ -1825,7 +1826,7 @@
           <a:p>
             <a:fld id="{27F5F0DE-742F-4352-B2C3-191EDE9D6ED5}" type="datetimeFigureOut">
               <a:rPr lang="zh-CN" altLang="en-US" smtClean="0"/>
-              <a:t>2018/10/2</a:t>
+              <a:t>2018/10/5</a:t>
             </a:fld>
             <a:endParaRPr lang="zh-CN" altLang="en-US"/>
           </a:p>
@@ -2102,7 +2103,7 @@
           <a:p>
             <a:fld id="{27F5F0DE-742F-4352-B2C3-191EDE9D6ED5}" type="datetimeFigureOut">
               <a:rPr lang="zh-CN" altLang="en-US" smtClean="0"/>
-              <a:t>2018/10/2</a:t>
+              <a:t>2018/10/5</a:t>
             </a:fld>
             <a:endParaRPr lang="zh-CN" altLang="en-US"/>
           </a:p>
@@ -2359,7 +2360,7 @@
           <a:p>
             <a:fld id="{27F5F0DE-742F-4352-B2C3-191EDE9D6ED5}" type="datetimeFigureOut">
               <a:rPr lang="zh-CN" altLang="en-US" smtClean="0"/>
-              <a:t>2018/10/2</a:t>
+              <a:t>2018/10/5</a:t>
             </a:fld>
             <a:endParaRPr lang="zh-CN" altLang="en-US"/>
           </a:p>
@@ -2572,7 +2573,7 @@
           <a:p>
             <a:fld id="{27F5F0DE-742F-4352-B2C3-191EDE9D6ED5}" type="datetimeFigureOut">
               <a:rPr lang="zh-CN" altLang="en-US" smtClean="0"/>
-              <a:t>2018/10/2</a:t>
+              <a:t>2018/10/5</a:t>
             </a:fld>
             <a:endParaRPr lang="zh-CN" altLang="en-US"/>
           </a:p>
@@ -6676,6 +6677,580 @@
       </p:grpSpPr>
       <p:sp>
         <p:nvSpPr>
+          <p:cNvPr id="69" name="矩形: 圆角 68">
+            <a:extLst>
+              <a:ext uri="{FF2B5EF4-FFF2-40B4-BE49-F238E27FC236}">
+                <a16:creationId xmlns:a16="http://schemas.microsoft.com/office/drawing/2014/main" id="{9C7C5F24-F92A-4A86-B2AE-41613A8FCC46}"/>
+              </a:ext>
+            </a:extLst>
+          </p:cNvPr>
+          <p:cNvSpPr/>
+          <p:nvPr/>
+        </p:nvSpPr>
+        <p:spPr>
+          <a:xfrm>
+            <a:off x="2877311" y="1383060"/>
+            <a:ext cx="8449799" cy="824018"/>
+          </a:xfrm>
+          <a:prstGeom prst="roundRect">
+            <a:avLst/>
+          </a:prstGeom>
+          <a:solidFill>
+            <a:schemeClr val="bg2">
+              <a:lumMod val="75000"/>
+            </a:schemeClr>
+          </a:solidFill>
+        </p:spPr>
+        <p:style>
+          <a:lnRef idx="3">
+            <a:schemeClr val="lt1"/>
+          </a:lnRef>
+          <a:fillRef idx="1">
+            <a:schemeClr val="accent4"/>
+          </a:fillRef>
+          <a:effectRef idx="1">
+            <a:schemeClr val="accent4"/>
+          </a:effectRef>
+          <a:fontRef idx="minor">
+            <a:schemeClr val="lt1"/>
+          </a:fontRef>
+        </p:style>
+        <p:txBody>
+          <a:bodyPr rtlCol="0" anchor="ctr"/>
+          <a:lstStyle/>
+          <a:p>
+            <a:pPr algn="ctr"/>
+            <a:r>
+              <a:rPr lang="zh-CN" altLang="en-US" dirty="0"/>
+              <a:t>用户</a:t>
+            </a:r>
+            <a:endParaRPr lang="en-US" altLang="zh-CN" dirty="0"/>
+          </a:p>
+        </p:txBody>
+      </p:sp>
+      <p:sp>
+        <p:nvSpPr>
+          <p:cNvPr id="70" name="矩形: 圆角 69">
+            <a:extLst>
+              <a:ext uri="{FF2B5EF4-FFF2-40B4-BE49-F238E27FC236}">
+                <a16:creationId xmlns:a16="http://schemas.microsoft.com/office/drawing/2014/main" id="{EB100F23-57D8-439A-9308-06AF3EF6887D}"/>
+              </a:ext>
+            </a:extLst>
+          </p:cNvPr>
+          <p:cNvSpPr/>
+          <p:nvPr/>
+        </p:nvSpPr>
+        <p:spPr>
+          <a:xfrm>
+            <a:off x="2877311" y="3076716"/>
+            <a:ext cx="8449799" cy="1288019"/>
+          </a:xfrm>
+          <a:prstGeom prst="roundRect">
+            <a:avLst/>
+          </a:prstGeom>
+          <a:solidFill>
+            <a:schemeClr val="accent2">
+              <a:lumMod val="20000"/>
+              <a:lumOff val="80000"/>
+            </a:schemeClr>
+          </a:solidFill>
+        </p:spPr>
+        <p:style>
+          <a:lnRef idx="2">
+            <a:schemeClr val="accent1">
+              <a:shade val="50000"/>
+            </a:schemeClr>
+          </a:lnRef>
+          <a:fillRef idx="1">
+            <a:schemeClr val="accent1"/>
+          </a:fillRef>
+          <a:effectRef idx="0">
+            <a:schemeClr val="accent1"/>
+          </a:effectRef>
+          <a:fontRef idx="minor">
+            <a:schemeClr val="lt1"/>
+          </a:fontRef>
+        </p:style>
+        <p:txBody>
+          <a:bodyPr rtlCol="0" anchor="ctr"/>
+          <a:lstStyle/>
+          <a:p>
+            <a:pPr algn="ctr"/>
+            <a:endParaRPr lang="zh-CN" altLang="en-US"/>
+          </a:p>
+        </p:txBody>
+      </p:sp>
+      <p:sp>
+        <p:nvSpPr>
+          <p:cNvPr id="91" name="矩形: 圆角 90">
+            <a:extLst>
+              <a:ext uri="{FF2B5EF4-FFF2-40B4-BE49-F238E27FC236}">
+                <a16:creationId xmlns:a16="http://schemas.microsoft.com/office/drawing/2014/main" id="{BA148A32-3CCB-489A-8EE5-64C20F63CF60}"/>
+              </a:ext>
+            </a:extLst>
+          </p:cNvPr>
+          <p:cNvSpPr/>
+          <p:nvPr/>
+        </p:nvSpPr>
+        <p:spPr>
+          <a:xfrm>
+            <a:off x="3073103" y="3472717"/>
+            <a:ext cx="3290199" cy="585272"/>
+          </a:xfrm>
+          <a:prstGeom prst="roundRect">
+            <a:avLst/>
+          </a:prstGeom>
+        </p:spPr>
+        <p:style>
+          <a:lnRef idx="2">
+            <a:schemeClr val="accent1">
+              <a:shade val="50000"/>
+            </a:schemeClr>
+          </a:lnRef>
+          <a:fillRef idx="1">
+            <a:schemeClr val="accent1"/>
+          </a:fillRef>
+          <a:effectRef idx="0">
+            <a:schemeClr val="accent1"/>
+          </a:effectRef>
+          <a:fontRef idx="minor">
+            <a:schemeClr val="lt1"/>
+          </a:fontRef>
+        </p:style>
+        <p:txBody>
+          <a:bodyPr rtlCol="0" anchor="ctr"/>
+          <a:lstStyle/>
+          <a:p>
+            <a:pPr algn="ctr"/>
+            <a:r>
+              <a:rPr lang="en-US" altLang="zh-CN" dirty="0"/>
+              <a:t>KeepAlived + MySql01</a:t>
+            </a:r>
+            <a:r>
+              <a:rPr lang="zh-CN" altLang="en-US" dirty="0"/>
+              <a:t>（</a:t>
+            </a:r>
+            <a:r>
+              <a:rPr lang="en-US" altLang="zh-CN" dirty="0"/>
+              <a:t>192.168.1.132</a:t>
+            </a:r>
+            <a:r>
+              <a:rPr lang="zh-CN" altLang="en-US" dirty="0"/>
+              <a:t>）</a:t>
+            </a:r>
+          </a:p>
+        </p:txBody>
+      </p:sp>
+      <p:sp>
+        <p:nvSpPr>
+          <p:cNvPr id="92" name="矩形: 圆角 91">
+            <a:extLst>
+              <a:ext uri="{FF2B5EF4-FFF2-40B4-BE49-F238E27FC236}">
+                <a16:creationId xmlns:a16="http://schemas.microsoft.com/office/drawing/2014/main" id="{D2EF126C-849F-4709-83DB-8E2AB0CCF587}"/>
+              </a:ext>
+            </a:extLst>
+          </p:cNvPr>
+          <p:cNvSpPr/>
+          <p:nvPr/>
+        </p:nvSpPr>
+        <p:spPr>
+          <a:xfrm>
+            <a:off x="7902827" y="3472717"/>
+            <a:ext cx="3265045" cy="585272"/>
+          </a:xfrm>
+          <a:prstGeom prst="roundRect">
+            <a:avLst/>
+          </a:prstGeom>
+        </p:spPr>
+        <p:style>
+          <a:lnRef idx="2">
+            <a:schemeClr val="accent1">
+              <a:shade val="50000"/>
+            </a:schemeClr>
+          </a:lnRef>
+          <a:fillRef idx="1">
+            <a:schemeClr val="accent1"/>
+          </a:fillRef>
+          <a:effectRef idx="0">
+            <a:schemeClr val="accent1"/>
+          </a:effectRef>
+          <a:fontRef idx="minor">
+            <a:schemeClr val="lt1"/>
+          </a:fontRef>
+        </p:style>
+        <p:txBody>
+          <a:bodyPr rtlCol="0" anchor="ctr"/>
+          <a:lstStyle/>
+          <a:p>
+            <a:pPr algn="ctr"/>
+            <a:r>
+              <a:rPr lang="en-US" altLang="zh-CN" dirty="0"/>
+              <a:t>HAProxy + MySql02</a:t>
+            </a:r>
+            <a:r>
+              <a:rPr lang="zh-CN" altLang="en-US" dirty="0"/>
+              <a:t> （</a:t>
+            </a:r>
+            <a:r>
+              <a:rPr lang="en-US" altLang="zh-CN" dirty="0"/>
+              <a:t>192.168.1.133</a:t>
+            </a:r>
+            <a:r>
+              <a:rPr lang="zh-CN" altLang="en-US" dirty="0"/>
+              <a:t>）</a:t>
+            </a:r>
+          </a:p>
+        </p:txBody>
+      </p:sp>
+      <p:sp>
+        <p:nvSpPr>
+          <p:cNvPr id="95" name="文本框 94">
+            <a:extLst>
+              <a:ext uri="{FF2B5EF4-FFF2-40B4-BE49-F238E27FC236}">
+                <a16:creationId xmlns:a16="http://schemas.microsoft.com/office/drawing/2014/main" id="{DB3B4904-5D5E-4BEE-8041-DA6F1A326A25}"/>
+              </a:ext>
+            </a:extLst>
+          </p:cNvPr>
+          <p:cNvSpPr txBox="1"/>
+          <p:nvPr/>
+        </p:nvSpPr>
+        <p:spPr>
+          <a:xfrm>
+            <a:off x="7102210" y="2462193"/>
+            <a:ext cx="1868837" cy="307777"/>
+          </a:xfrm>
+          <a:prstGeom prst="rect">
+            <a:avLst/>
+          </a:prstGeom>
+          <a:noFill/>
+        </p:spPr>
+        <p:txBody>
+          <a:bodyPr wrap="square" rtlCol="0">
+            <a:spAutoFit/>
+          </a:bodyPr>
+          <a:lstStyle/>
+          <a:p>
+            <a:r>
+              <a:rPr lang="en-US" altLang="zh-CN" sz="1400" b="1" dirty="0">
+                <a:solidFill>
+                  <a:srgbClr val="FF0000"/>
+                </a:solidFill>
+              </a:rPr>
+              <a:t>VIP</a:t>
+            </a:r>
+            <a:r>
+              <a:rPr lang="en-US" altLang="zh-CN" sz="1400" dirty="0">
+                <a:solidFill>
+                  <a:srgbClr val="FF0000"/>
+                </a:solidFill>
+              </a:rPr>
+              <a:t>: 192.168.1.134</a:t>
+            </a:r>
+            <a:endParaRPr lang="zh-CN" altLang="en-US" sz="1400" dirty="0">
+              <a:solidFill>
+                <a:srgbClr val="FF0000"/>
+              </a:solidFill>
+            </a:endParaRPr>
+          </a:p>
+        </p:txBody>
+      </p:sp>
+      <p:cxnSp>
+        <p:nvCxnSpPr>
+          <p:cNvPr id="97" name="直接箭头连接符 96">
+            <a:extLst>
+              <a:ext uri="{FF2B5EF4-FFF2-40B4-BE49-F238E27FC236}">
+                <a16:creationId xmlns:a16="http://schemas.microsoft.com/office/drawing/2014/main" id="{BCDEF35E-DAAE-4C31-82BA-6C4F939F00EC}"/>
+              </a:ext>
+            </a:extLst>
+          </p:cNvPr>
+          <p:cNvCxnSpPr>
+            <a:cxnSpLocks/>
+            <a:stCxn id="70" idx="0"/>
+            <a:endCxn id="91" idx="0"/>
+          </p:cNvCxnSpPr>
+          <p:nvPr/>
+        </p:nvCxnSpPr>
+        <p:spPr>
+          <a:xfrm flipH="1">
+            <a:off x="4718203" y="3076716"/>
+            <a:ext cx="2384008" cy="396001"/>
+          </a:xfrm>
+          <a:prstGeom prst="straightConnector1">
+            <a:avLst/>
+          </a:prstGeom>
+          <a:ln>
+            <a:tailEnd type="triangle"/>
+          </a:ln>
+        </p:spPr>
+        <p:style>
+          <a:lnRef idx="1">
+            <a:schemeClr val="accent1"/>
+          </a:lnRef>
+          <a:fillRef idx="0">
+            <a:schemeClr val="accent1"/>
+          </a:fillRef>
+          <a:effectRef idx="0">
+            <a:schemeClr val="accent1"/>
+          </a:effectRef>
+          <a:fontRef idx="minor">
+            <a:schemeClr val="tx1"/>
+          </a:fontRef>
+        </p:style>
+      </p:cxnSp>
+      <p:cxnSp>
+        <p:nvCxnSpPr>
+          <p:cNvPr id="98" name="直接箭头连接符 97">
+            <a:extLst>
+              <a:ext uri="{FF2B5EF4-FFF2-40B4-BE49-F238E27FC236}">
+                <a16:creationId xmlns:a16="http://schemas.microsoft.com/office/drawing/2014/main" id="{B9BC1703-4D01-427C-BDE9-C09A442B9306}"/>
+              </a:ext>
+            </a:extLst>
+          </p:cNvPr>
+          <p:cNvCxnSpPr>
+            <a:cxnSpLocks/>
+            <a:stCxn id="70" idx="0"/>
+            <a:endCxn id="92" idx="0"/>
+          </p:cNvCxnSpPr>
+          <p:nvPr/>
+        </p:nvCxnSpPr>
+        <p:spPr>
+          <a:xfrm>
+            <a:off x="7102211" y="3076716"/>
+            <a:ext cx="2433139" cy="396001"/>
+          </a:xfrm>
+          <a:prstGeom prst="straightConnector1">
+            <a:avLst/>
+          </a:prstGeom>
+          <a:ln>
+            <a:tailEnd type="triangle"/>
+          </a:ln>
+        </p:spPr>
+        <p:style>
+          <a:lnRef idx="1">
+            <a:schemeClr val="accent1"/>
+          </a:lnRef>
+          <a:fillRef idx="0">
+            <a:schemeClr val="accent1"/>
+          </a:fillRef>
+          <a:effectRef idx="0">
+            <a:schemeClr val="accent1"/>
+          </a:effectRef>
+          <a:fontRef idx="minor">
+            <a:schemeClr val="tx1"/>
+          </a:fontRef>
+        </p:style>
+      </p:cxnSp>
+      <p:cxnSp>
+        <p:nvCxnSpPr>
+          <p:cNvPr id="100" name="直接箭头连接符 99">
+            <a:extLst>
+              <a:ext uri="{FF2B5EF4-FFF2-40B4-BE49-F238E27FC236}">
+                <a16:creationId xmlns:a16="http://schemas.microsoft.com/office/drawing/2014/main" id="{19F60070-AC3A-4564-AD90-7D9C304ED9A5}"/>
+              </a:ext>
+            </a:extLst>
+          </p:cNvPr>
+          <p:cNvCxnSpPr>
+            <a:cxnSpLocks/>
+            <a:stCxn id="69" idx="2"/>
+            <a:endCxn id="70" idx="0"/>
+          </p:cNvCxnSpPr>
+          <p:nvPr/>
+        </p:nvCxnSpPr>
+        <p:spPr>
+          <a:xfrm>
+            <a:off x="7102211" y="2207078"/>
+            <a:ext cx="0" cy="869638"/>
+          </a:xfrm>
+          <a:prstGeom prst="straightConnector1">
+            <a:avLst/>
+          </a:prstGeom>
+          <a:ln>
+            <a:tailEnd type="triangle"/>
+          </a:ln>
+        </p:spPr>
+        <p:style>
+          <a:lnRef idx="1">
+            <a:schemeClr val="accent1"/>
+          </a:lnRef>
+          <a:fillRef idx="0">
+            <a:schemeClr val="accent1"/>
+          </a:fillRef>
+          <a:effectRef idx="0">
+            <a:schemeClr val="accent1"/>
+          </a:effectRef>
+          <a:fontRef idx="minor">
+            <a:schemeClr val="tx1"/>
+          </a:fontRef>
+        </p:style>
+      </p:cxnSp>
+      <p:cxnSp>
+        <p:nvCxnSpPr>
+          <p:cNvPr id="28" name="直接箭头连接符 27">
+            <a:extLst>
+              <a:ext uri="{FF2B5EF4-FFF2-40B4-BE49-F238E27FC236}">
+                <a16:creationId xmlns:a16="http://schemas.microsoft.com/office/drawing/2014/main" id="{A7BB36D6-3541-483A-9C94-3151AB4310C5}"/>
+              </a:ext>
+            </a:extLst>
+          </p:cNvPr>
+          <p:cNvCxnSpPr/>
+          <p:nvPr/>
+        </p:nvCxnSpPr>
+        <p:spPr>
+          <a:xfrm>
+            <a:off x="6363302" y="3623189"/>
+            <a:ext cx="1539525" cy="0"/>
+          </a:xfrm>
+          <a:prstGeom prst="straightConnector1">
+            <a:avLst/>
+          </a:prstGeom>
+          <a:ln w="38100" cap="flat" cmpd="sng" algn="ctr">
+            <a:solidFill>
+              <a:schemeClr val="accent2"/>
+            </a:solidFill>
+            <a:prstDash val="dash"/>
+            <a:round/>
+            <a:headEnd type="none" w="med" len="med"/>
+            <a:tailEnd type="triangle" w="med" len="med"/>
+          </a:ln>
+        </p:spPr>
+        <p:style>
+          <a:lnRef idx="0">
+            <a:scrgbClr r="0" g="0" b="0"/>
+          </a:lnRef>
+          <a:fillRef idx="0">
+            <a:scrgbClr r="0" g="0" b="0"/>
+          </a:fillRef>
+          <a:effectRef idx="0">
+            <a:scrgbClr r="0" g="0" b="0"/>
+          </a:effectRef>
+          <a:fontRef idx="minor">
+            <a:schemeClr val="tx1"/>
+          </a:fontRef>
+        </p:style>
+      </p:cxnSp>
+      <p:sp>
+        <p:nvSpPr>
+          <p:cNvPr id="101" name="文本框 100">
+            <a:extLst>
+              <a:ext uri="{FF2B5EF4-FFF2-40B4-BE49-F238E27FC236}">
+                <a16:creationId xmlns:a16="http://schemas.microsoft.com/office/drawing/2014/main" id="{F140DE28-D2FC-4ACB-9588-2F2661382BEC}"/>
+              </a:ext>
+            </a:extLst>
+          </p:cNvPr>
+          <p:cNvSpPr txBox="1"/>
+          <p:nvPr/>
+        </p:nvSpPr>
+        <p:spPr>
+          <a:xfrm>
+            <a:off x="6733330" y="3919765"/>
+            <a:ext cx="1825445" cy="307777"/>
+          </a:xfrm>
+          <a:prstGeom prst="rect">
+            <a:avLst/>
+          </a:prstGeom>
+          <a:noFill/>
+        </p:spPr>
+        <p:txBody>
+          <a:bodyPr wrap="square" rtlCol="0">
+            <a:spAutoFit/>
+          </a:bodyPr>
+          <a:lstStyle/>
+          <a:p>
+            <a:r>
+              <a:rPr lang="zh-CN" altLang="en-US" sz="1400" b="1" dirty="0">
+                <a:solidFill>
+                  <a:srgbClr val="FF0000"/>
+                </a:solidFill>
+              </a:rPr>
+              <a:t>主主同步</a:t>
+            </a:r>
+            <a:endParaRPr lang="zh-CN" altLang="en-US" sz="1400" dirty="0">
+              <a:solidFill>
+                <a:srgbClr val="FF0000"/>
+              </a:solidFill>
+            </a:endParaRPr>
+          </a:p>
+        </p:txBody>
+      </p:sp>
+      <p:cxnSp>
+        <p:nvCxnSpPr>
+          <p:cNvPr id="14" name="直接箭头连接符 13">
+            <a:extLst>
+              <a:ext uri="{FF2B5EF4-FFF2-40B4-BE49-F238E27FC236}">
+                <a16:creationId xmlns:a16="http://schemas.microsoft.com/office/drawing/2014/main" id="{0F285A37-4D48-43CF-849F-F5187D63B0B1}"/>
+              </a:ext>
+            </a:extLst>
+          </p:cNvPr>
+          <p:cNvCxnSpPr>
+            <a:cxnSpLocks/>
+          </p:cNvCxnSpPr>
+          <p:nvPr/>
+        </p:nvCxnSpPr>
+        <p:spPr>
+          <a:xfrm flipH="1">
+            <a:off x="6363303" y="3864864"/>
+            <a:ext cx="1539524" cy="0"/>
+          </a:xfrm>
+          <a:prstGeom prst="straightConnector1">
+            <a:avLst/>
+          </a:prstGeom>
+          <a:ln w="38100" cap="flat" cmpd="sng" algn="ctr">
+            <a:solidFill>
+              <a:schemeClr val="accent2"/>
+            </a:solidFill>
+            <a:prstDash val="dash"/>
+            <a:round/>
+            <a:headEnd type="none" w="med" len="med"/>
+            <a:tailEnd type="triangle" w="med" len="med"/>
+          </a:ln>
+        </p:spPr>
+        <p:style>
+          <a:lnRef idx="0">
+            <a:scrgbClr r="0" g="0" b="0"/>
+          </a:lnRef>
+          <a:fillRef idx="0">
+            <a:scrgbClr r="0" g="0" b="0"/>
+          </a:fillRef>
+          <a:effectRef idx="0">
+            <a:scrgbClr r="0" g="0" b="0"/>
+          </a:effectRef>
+          <a:fontRef idx="minor">
+            <a:schemeClr val="tx1"/>
+          </a:fontRef>
+        </p:style>
+      </p:cxnSp>
+    </p:spTree>
+    <p:extLst>
+      <p:ext uri="{BB962C8B-B14F-4D97-AF65-F5344CB8AC3E}">
+        <p14:creationId xmlns:p14="http://schemas.microsoft.com/office/powerpoint/2010/main" val="535061848"/>
+      </p:ext>
+    </p:extLst>
+  </p:cSld>
+  <p:clrMapOvr>
+    <a:masterClrMapping/>
+  </p:clrMapOvr>
+</p:sld>
+</file>
+
+<file path=ppt/slides/slide5.xml><?xml version="1.0" encoding="utf-8"?>
+<p:sld xmlns:a="http://schemas.openxmlformats.org/drawingml/2006/main" xmlns:r="http://schemas.openxmlformats.org/officeDocument/2006/relationships" xmlns:p="http://schemas.openxmlformats.org/presentationml/2006/main">
+  <p:cSld>
+    <p:spTree>
+      <p:nvGrpSpPr>
+        <p:cNvPr id="1" name=""/>
+        <p:cNvGrpSpPr/>
+        <p:nvPr/>
+      </p:nvGrpSpPr>
+      <p:grpSpPr>
+        <a:xfrm>
+          <a:off x="0" y="0"/>
+          <a:ext cx="0" cy="0"/>
+          <a:chOff x="0" y="0"/>
+          <a:chExt cx="0" cy="0"/>
+        </a:xfrm>
+      </p:grpSpPr>
+      <p:sp>
+        <p:nvSpPr>
           <p:cNvPr id="108" name="矩形: 圆角 107">
             <a:extLst>
               <a:ext uri="{FF2B5EF4-FFF2-40B4-BE49-F238E27FC236}">
@@ -9149,7 +9724,7 @@
 </p:sld>
 </file>
 
-<file path=ppt/slides/slide5.xml><?xml version="1.0" encoding="utf-8"?>
+<file path=ppt/slides/slide6.xml><?xml version="1.0" encoding="utf-8"?>
 <p:sld xmlns:a="http://schemas.openxmlformats.org/drawingml/2006/main" xmlns:r="http://schemas.openxmlformats.org/officeDocument/2006/relationships" xmlns:p="http://schemas.openxmlformats.org/presentationml/2006/main">
   <p:cSld>
     <p:spTree>

</xml_diff>

<commit_message>
Site updated: 2018-10-09 21:57:22
</commit_message>
<xml_diff>
--- a/posts/我的博客规划路线图/规划图.pptx
+++ b/posts/我的博客规划路线图/规划图.pptx
@@ -11,6 +11,7 @@
     <p:sldId id="261" r:id="rId5"/>
     <p:sldId id="260" r:id="rId6"/>
     <p:sldId id="259" r:id="rId7"/>
+    <p:sldId id="262" r:id="rId8"/>
   </p:sldIdLst>
   <p:sldSz cx="14400213" cy="8999538"/>
   <p:notesSz cx="6858000" cy="9144000"/>
@@ -248,7 +249,7 @@
           <a:p>
             <a:fld id="{27F5F0DE-742F-4352-B2C3-191EDE9D6ED5}" type="datetimeFigureOut">
               <a:rPr lang="zh-CN" altLang="en-US" smtClean="0"/>
-              <a:t>2018/10/5</a:t>
+              <a:t>2018/10/6</a:t>
             </a:fld>
             <a:endParaRPr lang="zh-CN" altLang="en-US"/>
           </a:p>
@@ -418,7 +419,7 @@
           <a:p>
             <a:fld id="{27F5F0DE-742F-4352-B2C3-191EDE9D6ED5}" type="datetimeFigureOut">
               <a:rPr lang="zh-CN" altLang="en-US" smtClean="0"/>
-              <a:t>2018/10/5</a:t>
+              <a:t>2018/10/6</a:t>
             </a:fld>
             <a:endParaRPr lang="zh-CN" altLang="en-US"/>
           </a:p>
@@ -598,7 +599,7 @@
           <a:p>
             <a:fld id="{27F5F0DE-742F-4352-B2C3-191EDE9D6ED5}" type="datetimeFigureOut">
               <a:rPr lang="zh-CN" altLang="en-US" smtClean="0"/>
-              <a:t>2018/10/5</a:t>
+              <a:t>2018/10/6</a:t>
             </a:fld>
             <a:endParaRPr lang="zh-CN" altLang="en-US"/>
           </a:p>
@@ -768,7 +769,7 @@
           <a:p>
             <a:fld id="{27F5F0DE-742F-4352-B2C3-191EDE9D6ED5}" type="datetimeFigureOut">
               <a:rPr lang="zh-CN" altLang="en-US" smtClean="0"/>
-              <a:t>2018/10/5</a:t>
+              <a:t>2018/10/6</a:t>
             </a:fld>
             <a:endParaRPr lang="zh-CN" altLang="en-US"/>
           </a:p>
@@ -1014,7 +1015,7 @@
           <a:p>
             <a:fld id="{27F5F0DE-742F-4352-B2C3-191EDE9D6ED5}" type="datetimeFigureOut">
               <a:rPr lang="zh-CN" altLang="en-US" smtClean="0"/>
-              <a:t>2018/10/5</a:t>
+              <a:t>2018/10/6</a:t>
             </a:fld>
             <a:endParaRPr lang="zh-CN" altLang="en-US"/>
           </a:p>
@@ -1246,7 +1247,7 @@
           <a:p>
             <a:fld id="{27F5F0DE-742F-4352-B2C3-191EDE9D6ED5}" type="datetimeFigureOut">
               <a:rPr lang="zh-CN" altLang="en-US" smtClean="0"/>
-              <a:t>2018/10/5</a:t>
+              <a:t>2018/10/6</a:t>
             </a:fld>
             <a:endParaRPr lang="zh-CN" altLang="en-US"/>
           </a:p>
@@ -1613,7 +1614,7 @@
           <a:p>
             <a:fld id="{27F5F0DE-742F-4352-B2C3-191EDE9D6ED5}" type="datetimeFigureOut">
               <a:rPr lang="zh-CN" altLang="en-US" smtClean="0"/>
-              <a:t>2018/10/5</a:t>
+              <a:t>2018/10/6</a:t>
             </a:fld>
             <a:endParaRPr lang="zh-CN" altLang="en-US"/>
           </a:p>
@@ -1731,7 +1732,7 @@
           <a:p>
             <a:fld id="{27F5F0DE-742F-4352-B2C3-191EDE9D6ED5}" type="datetimeFigureOut">
               <a:rPr lang="zh-CN" altLang="en-US" smtClean="0"/>
-              <a:t>2018/10/5</a:t>
+              <a:t>2018/10/6</a:t>
             </a:fld>
             <a:endParaRPr lang="zh-CN" altLang="en-US"/>
           </a:p>
@@ -1826,7 +1827,7 @@
           <a:p>
             <a:fld id="{27F5F0DE-742F-4352-B2C3-191EDE9D6ED5}" type="datetimeFigureOut">
               <a:rPr lang="zh-CN" altLang="en-US" smtClean="0"/>
-              <a:t>2018/10/5</a:t>
+              <a:t>2018/10/6</a:t>
             </a:fld>
             <a:endParaRPr lang="zh-CN" altLang="en-US"/>
           </a:p>
@@ -2103,7 +2104,7 @@
           <a:p>
             <a:fld id="{27F5F0DE-742F-4352-B2C3-191EDE9D6ED5}" type="datetimeFigureOut">
               <a:rPr lang="zh-CN" altLang="en-US" smtClean="0"/>
-              <a:t>2018/10/5</a:t>
+              <a:t>2018/10/6</a:t>
             </a:fld>
             <a:endParaRPr lang="zh-CN" altLang="en-US"/>
           </a:p>
@@ -2360,7 +2361,7 @@
           <a:p>
             <a:fld id="{27F5F0DE-742F-4352-B2C3-191EDE9D6ED5}" type="datetimeFigureOut">
               <a:rPr lang="zh-CN" altLang="en-US" smtClean="0"/>
-              <a:t>2018/10/5</a:t>
+              <a:t>2018/10/6</a:t>
             </a:fld>
             <a:endParaRPr lang="zh-CN" altLang="en-US"/>
           </a:p>
@@ -2573,7 +2574,7 @@
           <a:p>
             <a:fld id="{27F5F0DE-742F-4352-B2C3-191EDE9D6ED5}" type="datetimeFigureOut">
               <a:rPr lang="zh-CN" altLang="en-US" smtClean="0"/>
-              <a:t>2018/10/5</a:t>
+              <a:t>2018/10/6</a:t>
             </a:fld>
             <a:endParaRPr lang="zh-CN" altLang="en-US"/>
           </a:p>
@@ -6824,7 +6825,7 @@
             <a:pPr algn="ctr"/>
             <a:r>
               <a:rPr lang="en-US" altLang="zh-CN" dirty="0"/>
-              <a:t>KeepAlived + MySql01</a:t>
+              <a:t>KeepAlived + MySql_01</a:t>
             </a:r>
             <a:r>
               <a:rPr lang="zh-CN" altLang="en-US" dirty="0"/>
@@ -6885,7 +6886,7 @@
             <a:pPr algn="ctr"/>
             <a:r>
               <a:rPr lang="en-US" altLang="zh-CN" dirty="0"/>
-              <a:t>HAProxy + MySql02</a:t>
+              <a:t>HAProxy + MySql_02</a:t>
             </a:r>
             <a:r>
               <a:rPr lang="zh-CN" altLang="en-US" dirty="0"/>
@@ -12605,6 +12606,484 @@
     <p:extLst>
       <p:ext uri="{BB962C8B-B14F-4D97-AF65-F5344CB8AC3E}">
         <p14:creationId xmlns:p14="http://schemas.microsoft.com/office/powerpoint/2010/main" val="1946138909"/>
+      </p:ext>
+    </p:extLst>
+  </p:cSld>
+  <p:clrMapOvr>
+    <a:masterClrMapping/>
+  </p:clrMapOvr>
+</p:sld>
+</file>
+
+<file path=ppt/slides/slide7.xml><?xml version="1.0" encoding="utf-8"?>
+<p:sld xmlns:a="http://schemas.openxmlformats.org/drawingml/2006/main" xmlns:r="http://schemas.openxmlformats.org/officeDocument/2006/relationships" xmlns:p="http://schemas.openxmlformats.org/presentationml/2006/main">
+  <p:cSld>
+    <p:spTree>
+      <p:nvGrpSpPr>
+        <p:cNvPr id="1" name=""/>
+        <p:cNvGrpSpPr/>
+        <p:nvPr/>
+      </p:nvGrpSpPr>
+      <p:grpSpPr>
+        <a:xfrm>
+          <a:off x="0" y="0"/>
+          <a:ext cx="0" cy="0"/>
+          <a:chOff x="0" y="0"/>
+          <a:chExt cx="0" cy="0"/>
+        </a:xfrm>
+      </p:grpSpPr>
+      <p:sp>
+        <p:nvSpPr>
+          <p:cNvPr id="96" name="矩形: 圆角 95">
+            <a:extLst>
+              <a:ext uri="{FF2B5EF4-FFF2-40B4-BE49-F238E27FC236}">
+                <a16:creationId xmlns:a16="http://schemas.microsoft.com/office/drawing/2014/main" id="{A3B03214-E7F6-44C2-ACE1-994525866EB9}"/>
+              </a:ext>
+            </a:extLst>
+          </p:cNvPr>
+          <p:cNvSpPr/>
+          <p:nvPr/>
+        </p:nvSpPr>
+        <p:spPr>
+          <a:xfrm>
+            <a:off x="9838102" y="4499769"/>
+            <a:ext cx="2230754" cy="393932"/>
+          </a:xfrm>
+          <a:prstGeom prst="roundRect">
+            <a:avLst/>
+          </a:prstGeom>
+        </p:spPr>
+        <p:style>
+          <a:lnRef idx="2">
+            <a:schemeClr val="accent1">
+              <a:shade val="50000"/>
+            </a:schemeClr>
+          </a:lnRef>
+          <a:fillRef idx="1">
+            <a:schemeClr val="accent1"/>
+          </a:fillRef>
+          <a:effectRef idx="0">
+            <a:schemeClr val="accent1"/>
+          </a:effectRef>
+          <a:fontRef idx="minor">
+            <a:schemeClr val="lt1"/>
+          </a:fontRef>
+        </p:style>
+        <p:txBody>
+          <a:bodyPr rtlCol="0" anchor="ctr"/>
+          <a:lstStyle/>
+          <a:p>
+            <a:pPr algn="ctr"/>
+            <a:r>
+              <a:rPr lang="en-US" altLang="zh-CN" dirty="0" err="1"/>
+              <a:t>SsoService</a:t>
+            </a:r>
+            <a:endParaRPr lang="zh-CN" altLang="en-US" dirty="0"/>
+          </a:p>
+        </p:txBody>
+      </p:sp>
+      <p:sp>
+        <p:nvSpPr>
+          <p:cNvPr id="99" name="矩形: 圆角 98">
+            <a:extLst>
+              <a:ext uri="{FF2B5EF4-FFF2-40B4-BE49-F238E27FC236}">
+                <a16:creationId xmlns:a16="http://schemas.microsoft.com/office/drawing/2014/main" id="{D454655A-BD5A-4C17-B6CE-8CF8801BD6CC}"/>
+              </a:ext>
+            </a:extLst>
+          </p:cNvPr>
+          <p:cNvSpPr/>
+          <p:nvPr/>
+        </p:nvSpPr>
+        <p:spPr>
+          <a:xfrm>
+            <a:off x="9838102" y="5446957"/>
+            <a:ext cx="2230754" cy="393932"/>
+          </a:xfrm>
+          <a:prstGeom prst="roundRect">
+            <a:avLst/>
+          </a:prstGeom>
+        </p:spPr>
+        <p:style>
+          <a:lnRef idx="2">
+            <a:schemeClr val="accent1">
+              <a:shade val="50000"/>
+            </a:schemeClr>
+          </a:lnRef>
+          <a:fillRef idx="1">
+            <a:schemeClr val="accent1"/>
+          </a:fillRef>
+          <a:effectRef idx="0">
+            <a:schemeClr val="accent1"/>
+          </a:effectRef>
+          <a:fontRef idx="minor">
+            <a:schemeClr val="lt1"/>
+          </a:fontRef>
+        </p:style>
+        <p:txBody>
+          <a:bodyPr rtlCol="0" anchor="ctr"/>
+          <a:lstStyle/>
+          <a:p>
+            <a:pPr algn="ctr"/>
+            <a:r>
+              <a:rPr lang="en-US" altLang="zh-CN" dirty="0" err="1"/>
+              <a:t>UserService</a:t>
+            </a:r>
+            <a:endParaRPr lang="zh-CN" altLang="en-US" dirty="0"/>
+          </a:p>
+        </p:txBody>
+      </p:sp>
+      <p:sp>
+        <p:nvSpPr>
+          <p:cNvPr id="101" name="矩形: 圆角 100">
+            <a:extLst>
+              <a:ext uri="{FF2B5EF4-FFF2-40B4-BE49-F238E27FC236}">
+                <a16:creationId xmlns:a16="http://schemas.microsoft.com/office/drawing/2014/main" id="{6A2808C5-49FC-41E0-9925-FA53D8E3354A}"/>
+              </a:ext>
+            </a:extLst>
+          </p:cNvPr>
+          <p:cNvSpPr/>
+          <p:nvPr/>
+        </p:nvSpPr>
+        <p:spPr>
+          <a:xfrm>
+            <a:off x="9838102" y="4973363"/>
+            <a:ext cx="2230754" cy="393932"/>
+          </a:xfrm>
+          <a:prstGeom prst="roundRect">
+            <a:avLst/>
+          </a:prstGeom>
+        </p:spPr>
+        <p:style>
+          <a:lnRef idx="2">
+            <a:schemeClr val="accent1">
+              <a:shade val="50000"/>
+            </a:schemeClr>
+          </a:lnRef>
+          <a:fillRef idx="1">
+            <a:schemeClr val="accent1"/>
+          </a:fillRef>
+          <a:effectRef idx="0">
+            <a:schemeClr val="accent1"/>
+          </a:effectRef>
+          <a:fontRef idx="minor">
+            <a:schemeClr val="lt1"/>
+          </a:fontRef>
+        </p:style>
+        <p:txBody>
+          <a:bodyPr rtlCol="0" anchor="ctr"/>
+          <a:lstStyle/>
+          <a:p>
+            <a:pPr algn="ctr"/>
+            <a:r>
+              <a:rPr lang="en-US" altLang="zh-CN" dirty="0" err="1"/>
+              <a:t>UserPortal</a:t>
+            </a:r>
+            <a:endParaRPr lang="zh-CN" altLang="en-US" dirty="0"/>
+          </a:p>
+        </p:txBody>
+      </p:sp>
+      <p:sp>
+        <p:nvSpPr>
+          <p:cNvPr id="102" name="矩形: 圆角 101">
+            <a:extLst>
+              <a:ext uri="{FF2B5EF4-FFF2-40B4-BE49-F238E27FC236}">
+                <a16:creationId xmlns:a16="http://schemas.microsoft.com/office/drawing/2014/main" id="{11BC74D1-50EB-483B-87A9-001F6B620D45}"/>
+              </a:ext>
+            </a:extLst>
+          </p:cNvPr>
+          <p:cNvSpPr/>
+          <p:nvPr/>
+        </p:nvSpPr>
+        <p:spPr>
+          <a:xfrm>
+            <a:off x="7200106" y="4965932"/>
+            <a:ext cx="2230754" cy="393932"/>
+          </a:xfrm>
+          <a:prstGeom prst="roundRect">
+            <a:avLst/>
+          </a:prstGeom>
+        </p:spPr>
+        <p:style>
+          <a:lnRef idx="2">
+            <a:schemeClr val="accent1">
+              <a:shade val="50000"/>
+            </a:schemeClr>
+          </a:lnRef>
+          <a:fillRef idx="1">
+            <a:schemeClr val="accent1"/>
+          </a:fillRef>
+          <a:effectRef idx="0">
+            <a:schemeClr val="accent1"/>
+          </a:effectRef>
+          <a:fontRef idx="minor">
+            <a:schemeClr val="lt1"/>
+          </a:fontRef>
+        </p:style>
+        <p:txBody>
+          <a:bodyPr rtlCol="0" anchor="ctr"/>
+          <a:lstStyle/>
+          <a:p>
+            <a:pPr algn="ctr"/>
+            <a:r>
+              <a:rPr lang="en-US" altLang="zh-CN" dirty="0" err="1"/>
+              <a:t>ProductionService</a:t>
+            </a:r>
+            <a:endParaRPr lang="zh-CN" altLang="en-US" dirty="0"/>
+          </a:p>
+        </p:txBody>
+      </p:sp>
+      <p:sp>
+        <p:nvSpPr>
+          <p:cNvPr id="109" name="矩形: 圆角 108">
+            <a:extLst>
+              <a:ext uri="{FF2B5EF4-FFF2-40B4-BE49-F238E27FC236}">
+                <a16:creationId xmlns:a16="http://schemas.microsoft.com/office/drawing/2014/main" id="{B835DD8A-5149-41EF-9EA7-C7F32554C8E5}"/>
+              </a:ext>
+            </a:extLst>
+          </p:cNvPr>
+          <p:cNvSpPr/>
+          <p:nvPr/>
+        </p:nvSpPr>
+        <p:spPr>
+          <a:xfrm>
+            <a:off x="7200106" y="4499769"/>
+            <a:ext cx="2230754" cy="393932"/>
+          </a:xfrm>
+          <a:prstGeom prst="roundRect">
+            <a:avLst/>
+          </a:prstGeom>
+        </p:spPr>
+        <p:style>
+          <a:lnRef idx="2">
+            <a:schemeClr val="accent1">
+              <a:shade val="50000"/>
+            </a:schemeClr>
+          </a:lnRef>
+          <a:fillRef idx="1">
+            <a:schemeClr val="accent1"/>
+          </a:fillRef>
+          <a:effectRef idx="0">
+            <a:schemeClr val="accent1"/>
+          </a:effectRef>
+          <a:fontRef idx="minor">
+            <a:schemeClr val="lt1"/>
+          </a:fontRef>
+        </p:style>
+        <p:txBody>
+          <a:bodyPr rtlCol="0" anchor="ctr"/>
+          <a:lstStyle/>
+          <a:p>
+            <a:pPr algn="ctr"/>
+            <a:r>
+              <a:rPr lang="en-US" altLang="zh-CN" dirty="0" err="1"/>
+              <a:t>ProductionPortal</a:t>
+            </a:r>
+            <a:endParaRPr lang="zh-CN" altLang="en-US" dirty="0"/>
+          </a:p>
+        </p:txBody>
+      </p:sp>
+      <p:sp>
+        <p:nvSpPr>
+          <p:cNvPr id="110" name="矩形: 圆角 109">
+            <a:extLst>
+              <a:ext uri="{FF2B5EF4-FFF2-40B4-BE49-F238E27FC236}">
+                <a16:creationId xmlns:a16="http://schemas.microsoft.com/office/drawing/2014/main" id="{53108FC4-3ACB-454E-929C-C35D692E5ECA}"/>
+              </a:ext>
+            </a:extLst>
+          </p:cNvPr>
+          <p:cNvSpPr/>
+          <p:nvPr/>
+        </p:nvSpPr>
+        <p:spPr>
+          <a:xfrm>
+            <a:off x="4562111" y="4973363"/>
+            <a:ext cx="2230754" cy="393932"/>
+          </a:xfrm>
+          <a:prstGeom prst="roundRect">
+            <a:avLst/>
+          </a:prstGeom>
+        </p:spPr>
+        <p:style>
+          <a:lnRef idx="2">
+            <a:schemeClr val="accent1">
+              <a:shade val="50000"/>
+            </a:schemeClr>
+          </a:lnRef>
+          <a:fillRef idx="1">
+            <a:schemeClr val="accent1"/>
+          </a:fillRef>
+          <a:effectRef idx="0">
+            <a:schemeClr val="accent1"/>
+          </a:effectRef>
+          <a:fontRef idx="minor">
+            <a:schemeClr val="lt1"/>
+          </a:fontRef>
+        </p:style>
+        <p:txBody>
+          <a:bodyPr rtlCol="0" anchor="ctr"/>
+          <a:lstStyle/>
+          <a:p>
+            <a:pPr algn="ctr"/>
+            <a:r>
+              <a:rPr lang="en-US" altLang="zh-CN" dirty="0" err="1"/>
+              <a:t>ShoppingService</a:t>
+            </a:r>
+            <a:endParaRPr lang="zh-CN" altLang="en-US" dirty="0"/>
+          </a:p>
+        </p:txBody>
+      </p:sp>
+      <p:sp>
+        <p:nvSpPr>
+          <p:cNvPr id="111" name="矩形: 圆角 110">
+            <a:extLst>
+              <a:ext uri="{FF2B5EF4-FFF2-40B4-BE49-F238E27FC236}">
+                <a16:creationId xmlns:a16="http://schemas.microsoft.com/office/drawing/2014/main" id="{28776FCE-B642-452E-A7D5-479013D06002}"/>
+              </a:ext>
+            </a:extLst>
+          </p:cNvPr>
+          <p:cNvSpPr/>
+          <p:nvPr/>
+        </p:nvSpPr>
+        <p:spPr>
+          <a:xfrm>
+            <a:off x="4562111" y="4507200"/>
+            <a:ext cx="2230754" cy="393932"/>
+          </a:xfrm>
+          <a:prstGeom prst="roundRect">
+            <a:avLst/>
+          </a:prstGeom>
+        </p:spPr>
+        <p:style>
+          <a:lnRef idx="2">
+            <a:schemeClr val="accent1">
+              <a:shade val="50000"/>
+            </a:schemeClr>
+          </a:lnRef>
+          <a:fillRef idx="1">
+            <a:schemeClr val="accent1"/>
+          </a:fillRef>
+          <a:effectRef idx="0">
+            <a:schemeClr val="accent1"/>
+          </a:effectRef>
+          <a:fontRef idx="minor">
+            <a:schemeClr val="lt1"/>
+          </a:fontRef>
+        </p:style>
+        <p:txBody>
+          <a:bodyPr rtlCol="0" anchor="ctr"/>
+          <a:lstStyle/>
+          <a:p>
+            <a:pPr algn="ctr"/>
+            <a:r>
+              <a:rPr lang="en-US" altLang="zh-CN" dirty="0" err="1"/>
+              <a:t>ShoppingPortal</a:t>
+            </a:r>
+            <a:endParaRPr lang="zh-CN" altLang="en-US" dirty="0"/>
+          </a:p>
+        </p:txBody>
+      </p:sp>
+      <p:sp>
+        <p:nvSpPr>
+          <p:cNvPr id="2" name="文本框 1">
+            <a:extLst>
+              <a:ext uri="{FF2B5EF4-FFF2-40B4-BE49-F238E27FC236}">
+                <a16:creationId xmlns:a16="http://schemas.microsoft.com/office/drawing/2014/main" id="{25D2114E-1864-4B67-BB97-FB1D27DF28A4}"/>
+              </a:ext>
+            </a:extLst>
+          </p:cNvPr>
+          <p:cNvSpPr txBox="1"/>
+          <p:nvPr/>
+        </p:nvSpPr>
+        <p:spPr>
+          <a:xfrm>
+            <a:off x="1280160" y="731520"/>
+            <a:ext cx="3253070" cy="1477328"/>
+          </a:xfrm>
+          <a:prstGeom prst="rect">
+            <a:avLst/>
+          </a:prstGeom>
+          <a:noFill/>
+        </p:spPr>
+        <p:txBody>
+          <a:bodyPr wrap="none" rtlCol="0">
+            <a:spAutoFit/>
+          </a:bodyPr>
+          <a:lstStyle/>
+          <a:p>
+            <a:pPr marL="342900" indent="-342900">
+              <a:buAutoNum type="arabicPeriod"/>
+            </a:pPr>
+            <a:r>
+              <a:rPr lang="en-US" altLang="zh-CN" dirty="0"/>
+              <a:t>Maven</a:t>
+            </a:r>
+            <a:r>
+              <a:rPr lang="zh-CN" altLang="en-US" dirty="0"/>
+              <a:t>的使用</a:t>
+            </a:r>
+            <a:endParaRPr lang="en-US" altLang="zh-CN" dirty="0"/>
+          </a:p>
+          <a:p>
+            <a:pPr marL="342900" indent="-342900">
+              <a:buAutoNum type="arabicPeriod"/>
+            </a:pPr>
+            <a:r>
+              <a:rPr lang="en-US" altLang="zh-CN" dirty="0"/>
+              <a:t>Log4j</a:t>
+            </a:r>
+            <a:r>
+              <a:rPr lang="zh-CN" altLang="en-US" dirty="0"/>
+              <a:t>的配置</a:t>
+            </a:r>
+            <a:endParaRPr lang="en-US" altLang="zh-CN" dirty="0"/>
+          </a:p>
+          <a:p>
+            <a:pPr marL="342900" indent="-342900">
+              <a:buAutoNum type="arabicPeriod"/>
+            </a:pPr>
+            <a:r>
+              <a:rPr lang="en-US" altLang="zh-CN" dirty="0" err="1"/>
+              <a:t>Sso</a:t>
+            </a:r>
+            <a:r>
+              <a:rPr lang="zh-CN" altLang="en-US" dirty="0"/>
+              <a:t>的搭建</a:t>
+            </a:r>
+            <a:endParaRPr lang="en-US" altLang="zh-CN" dirty="0"/>
+          </a:p>
+          <a:p>
+            <a:pPr marL="342900" indent="-342900">
+              <a:buAutoNum type="arabicPeriod"/>
+            </a:pPr>
+            <a:r>
+              <a:rPr lang="en-US" altLang="zh-CN" dirty="0" err="1"/>
+              <a:t>Springcloud</a:t>
+            </a:r>
+            <a:r>
+              <a:rPr lang="zh-CN" altLang="en-US" dirty="0"/>
+              <a:t>各个组件的使用</a:t>
+            </a:r>
+            <a:endParaRPr lang="en-US" altLang="zh-CN" dirty="0"/>
+          </a:p>
+          <a:p>
+            <a:pPr marL="342900" indent="-342900">
+              <a:buAutoNum type="arabicPeriod"/>
+            </a:pPr>
+            <a:r>
+              <a:rPr lang="en-US" altLang="zh-CN" dirty="0" err="1"/>
+              <a:t>mybatis</a:t>
+            </a:r>
+            <a:r>
+              <a:rPr lang="zh-CN" altLang="en-US" dirty="0"/>
+              <a:t>的使用</a:t>
+            </a:r>
+          </a:p>
+        </p:txBody>
+      </p:sp>
+    </p:spTree>
+    <p:extLst>
+      <p:ext uri="{BB962C8B-B14F-4D97-AF65-F5344CB8AC3E}">
+        <p14:creationId xmlns:p14="http://schemas.microsoft.com/office/powerpoint/2010/main" val="3821423209"/>
       </p:ext>
     </p:extLst>
   </p:cSld>

</xml_diff>